<commit_message>
Updated text agenda sample slides - extra shape in template
</commit_message>
<xml_diff>
--- a/doc/Agenda Lab Example - Text Agenda.pptx
+++ b/doc/Agenda Lab Example - Text Agenda.pptx
@@ -294,7 +294,7 @@
           <a:p>
             <a:fld id="{672627BE-A05D-4ACA-8E33-EA05D522C849}" type="datetimeFigureOut">
               <a:rPr lang="en-SG" smtClean="0"/>
-              <a:t>1/7/2015</a:t>
+              <a:t>13/7/2015</a:t>
             </a:fld>
             <a:endParaRPr lang="en-SG"/>
           </a:p>
@@ -608,7 +608,7 @@
           <a:p>
             <a:r>
               <a:rPr lang="en-SG" smtClean="0"/>
-              <a:t>This notes page is used to store data - Do not edit the notes. UFBUVGVtcGxhdGVNYXJrZXI=@VGl0bGUgMQ==@UHB0TGFic0FnZW5kYV8mXkBDb250ZW50U2hhcGVfJl5AMjAxNTA3MDExOTE3NTMzMjU1MA==@3199112916</a:t>
+              <a:t>This notes page is used to store data - Do not edit the notes. UFBUVGVtcGxhdGVNYXJrZXI=@VGl0bGUgMQ==@UHB0TGFic0FnZW5kYV8mXkBDb250ZW50U2hhcGVfJl5AMjAxNTA3MDExOTE3NTMzMjU1MA==@VW5uYW1lZCBTaGFwZSAyMDE1MDcxMzEzNTMxODcwNzIxNA==@1456392278</a:t>
             </a:r>
             <a:endParaRPr lang="en-SG"/>
           </a:p>
@@ -1040,7 +1040,7 @@
           <a:p>
             <a:fld id="{9EC42EEE-3E5D-4D0F-A5A1-DBE4DDAAFE18}" type="datetimeFigureOut">
               <a:rPr lang="en-SG" smtClean="0"/>
-              <a:t>1/7/2015</a:t>
+              <a:t>13/7/2015</a:t>
             </a:fld>
             <a:endParaRPr lang="en-SG"/>
           </a:p>
@@ -1219,7 +1219,7 @@
           <a:p>
             <a:fld id="{9EC42EEE-3E5D-4D0F-A5A1-DBE4DDAAFE18}" type="datetimeFigureOut">
               <a:rPr lang="en-SG" smtClean="0"/>
-              <a:t>1/7/2015</a:t>
+              <a:t>13/7/2015</a:t>
             </a:fld>
             <a:endParaRPr lang="en-SG"/>
           </a:p>
@@ -1398,7 +1398,7 @@
           <a:p>
             <a:fld id="{9EC42EEE-3E5D-4D0F-A5A1-DBE4DDAAFE18}" type="datetimeFigureOut">
               <a:rPr lang="en-SG" smtClean="0"/>
-              <a:t>1/7/2015</a:t>
+              <a:t>13/7/2015</a:t>
             </a:fld>
             <a:endParaRPr lang="en-SG"/>
           </a:p>
@@ -1563,7 +1563,7 @@
           <a:p>
             <a:fld id="{9EC42EEE-3E5D-4D0F-A5A1-DBE4DDAAFE18}" type="datetimeFigureOut">
               <a:rPr lang="en-SG" smtClean="0"/>
-              <a:t>1/7/2015</a:t>
+              <a:t>13/7/2015</a:t>
             </a:fld>
             <a:endParaRPr lang="en-SG"/>
           </a:p>
@@ -1741,7 +1741,7 @@
           <a:p>
             <a:fld id="{9EC42EEE-3E5D-4D0F-A5A1-DBE4DDAAFE18}" type="datetimeFigureOut">
               <a:rPr lang="en-SG" smtClean="0"/>
-              <a:t>1/7/2015</a:t>
+              <a:t>13/7/2015</a:t>
             </a:fld>
             <a:endParaRPr lang="en-SG"/>
           </a:p>
@@ -2001,7 +2001,7 @@
           <a:p>
             <a:fld id="{9EC42EEE-3E5D-4D0F-A5A1-DBE4DDAAFE18}" type="datetimeFigureOut">
               <a:rPr lang="en-SG" smtClean="0"/>
-              <a:t>1/7/2015</a:t>
+              <a:t>13/7/2015</a:t>
             </a:fld>
             <a:endParaRPr lang="en-SG"/>
           </a:p>
@@ -2135,7 +2135,7 @@
           <a:p>
             <a:fld id="{9EC42EEE-3E5D-4D0F-A5A1-DBE4DDAAFE18}" type="datetimeFigureOut">
               <a:rPr lang="en-SG" smtClean="0"/>
-              <a:t>1/7/2015</a:t>
+              <a:t>13/7/2015</a:t>
             </a:fld>
             <a:endParaRPr lang="en-SG"/>
           </a:p>
@@ -2529,7 +2529,7 @@
           <a:p>
             <a:fld id="{9EC42EEE-3E5D-4D0F-A5A1-DBE4DDAAFE18}" type="datetimeFigureOut">
               <a:rPr lang="en-SG" smtClean="0"/>
-              <a:t>1/7/2015</a:t>
+              <a:t>13/7/2015</a:t>
             </a:fld>
             <a:endParaRPr lang="en-SG"/>
           </a:p>
@@ -2777,7 +2777,7 @@
           <a:p>
             <a:fld id="{9EC42EEE-3E5D-4D0F-A5A1-DBE4DDAAFE18}" type="datetimeFigureOut">
               <a:rPr lang="en-SG" smtClean="0"/>
-              <a:t>1/7/2015</a:t>
+              <a:t>13/7/2015</a:t>
             </a:fld>
             <a:endParaRPr lang="en-SG"/>
           </a:p>
@@ -2888,7 +2888,7 @@
           <a:p>
             <a:fld id="{9EC42EEE-3E5D-4D0F-A5A1-DBE4DDAAFE18}" type="datetimeFigureOut">
               <a:rPr lang="en-SG" smtClean="0"/>
-              <a:t>1/7/2015</a:t>
+              <a:t>13/7/2015</a:t>
             </a:fld>
             <a:endParaRPr lang="en-SG"/>
           </a:p>
@@ -3074,7 +3074,7 @@
           <a:p>
             <a:fld id="{9EC42EEE-3E5D-4D0F-A5A1-DBE4DDAAFE18}" type="datetimeFigureOut">
               <a:rPr lang="en-SG" smtClean="0"/>
-              <a:t>1/7/2015</a:t>
+              <a:t>13/7/2015</a:t>
             </a:fld>
             <a:endParaRPr lang="en-SG"/>
           </a:p>
@@ -3252,7 +3252,7 @@
           <a:p>
             <a:fld id="{9EC42EEE-3E5D-4D0F-A5A1-DBE4DDAAFE18}" type="datetimeFigureOut">
               <a:rPr lang="en-SG" smtClean="0"/>
-              <a:t>1/7/2015</a:t>
+              <a:t>13/7/2015</a:t>
             </a:fld>
             <a:endParaRPr lang="en-SG"/>
           </a:p>
@@ -3439,7 +3439,7 @@
           <a:p>
             <a:fld id="{9EC42EEE-3E5D-4D0F-A5A1-DBE4DDAAFE18}" type="datetimeFigureOut">
               <a:rPr lang="en-SG" smtClean="0"/>
-              <a:t>1/7/2015</a:t>
+              <a:t>13/7/2015</a:t>
             </a:fld>
             <a:endParaRPr lang="en-SG"/>
           </a:p>
@@ -3635,7 +3635,7 @@
           <a:p>
             <a:fld id="{9EC42EEE-3E5D-4D0F-A5A1-DBE4DDAAFE18}" type="datetimeFigureOut">
               <a:rPr lang="en-SG" smtClean="0"/>
-              <a:t>1/7/2015</a:t>
+              <a:t>13/7/2015</a:t>
             </a:fld>
             <a:endParaRPr lang="en-SG"/>
           </a:p>
@@ -3826,7 +3826,7 @@
                 </a:solidFill>
               </a:rPr>
               <a:pPr/>
-              <a:t>1/7/2015</a:t>
+              <a:t>13/7/2015</a:t>
             </a:fld>
             <a:endParaRPr lang="en-SG">
               <a:solidFill>
@@ -4108,7 +4108,7 @@
                 </a:solidFill>
               </a:rPr>
               <a:pPr/>
-              <a:t>1/7/2015</a:t>
+              <a:t>13/7/2015</a:t>
             </a:fld>
             <a:endParaRPr lang="en-SG">
               <a:solidFill>
@@ -4264,7 +4264,7 @@
                 </a:solidFill>
               </a:rPr>
               <a:pPr/>
-              <a:t>1/7/2015</a:t>
+              <a:t>13/7/2015</a:t>
             </a:fld>
             <a:endParaRPr lang="en-SG">
               <a:solidFill>
@@ -4680,7 +4680,7 @@
                 </a:solidFill>
               </a:rPr>
               <a:pPr/>
-              <a:t>1/7/2015</a:t>
+              <a:t>13/7/2015</a:t>
             </a:fld>
             <a:endParaRPr lang="en-SG">
               <a:solidFill>
@@ -4950,7 +4950,7 @@
                 </a:solidFill>
               </a:rPr>
               <a:pPr/>
-              <a:t>1/7/2015</a:t>
+              <a:t>13/7/2015</a:t>
             </a:fld>
             <a:endParaRPr lang="en-SG">
               <a:solidFill>
@@ -5083,7 +5083,7 @@
                 </a:solidFill>
               </a:rPr>
               <a:pPr/>
-              <a:t>1/7/2015</a:t>
+              <a:t>13/7/2015</a:t>
             </a:fld>
             <a:endParaRPr lang="en-SG">
               <a:solidFill>
@@ -5291,7 +5291,7 @@
                 </a:solidFill>
               </a:rPr>
               <a:pPr/>
-              <a:t>1/7/2015</a:t>
+              <a:t>13/7/2015</a:t>
             </a:fld>
             <a:endParaRPr lang="en-SG">
               <a:solidFill>
@@ -5513,7 +5513,7 @@
                 </a:solidFill>
               </a:rPr>
               <a:pPr/>
-              <a:t>1/7/2015</a:t>
+              <a:t>13/7/2015</a:t>
             </a:fld>
             <a:endParaRPr lang="en-SG">
               <a:solidFill>
@@ -5782,7 +5782,7 @@
           <a:p>
             <a:fld id="{9EC42EEE-3E5D-4D0F-A5A1-DBE4DDAAFE18}" type="datetimeFigureOut">
               <a:rPr lang="en-SG" smtClean="0"/>
-              <a:t>1/7/2015</a:t>
+              <a:t>13/7/2015</a:t>
             </a:fld>
             <a:endParaRPr lang="en-SG"/>
           </a:p>
@@ -5970,7 +5970,7 @@
                 </a:solidFill>
               </a:rPr>
               <a:pPr/>
-              <a:t>1/7/2015</a:t>
+              <a:t>13/7/2015</a:t>
             </a:fld>
             <a:endParaRPr lang="en-SG">
               <a:solidFill>
@@ -6178,7 +6178,7 @@
                 </a:solidFill>
               </a:rPr>
               <a:pPr/>
-              <a:t>1/7/2015</a:t>
+              <a:t>13/7/2015</a:t>
             </a:fld>
             <a:endParaRPr lang="en-SG">
               <a:solidFill>
@@ -6460,7 +6460,7 @@
                 </a:solidFill>
               </a:rPr>
               <a:pPr/>
-              <a:t>1/7/2015</a:t>
+              <a:t>13/7/2015</a:t>
             </a:fld>
             <a:endParaRPr lang="en-SG">
               <a:solidFill>
@@ -6616,7 +6616,7 @@
                 </a:solidFill>
               </a:rPr>
               <a:pPr/>
-              <a:t>1/7/2015</a:t>
+              <a:t>13/7/2015</a:t>
             </a:fld>
             <a:endParaRPr lang="en-SG">
               <a:solidFill>
@@ -7032,7 +7032,7 @@
                 </a:solidFill>
               </a:rPr>
               <a:pPr/>
-              <a:t>1/7/2015</a:t>
+              <a:t>13/7/2015</a:t>
             </a:fld>
             <a:endParaRPr lang="en-SG">
               <a:solidFill>
@@ -7302,7 +7302,7 @@
                 </a:solidFill>
               </a:rPr>
               <a:pPr/>
-              <a:t>1/7/2015</a:t>
+              <a:t>13/7/2015</a:t>
             </a:fld>
             <a:endParaRPr lang="en-SG">
               <a:solidFill>
@@ -7435,7 +7435,7 @@
                 </a:solidFill>
               </a:rPr>
               <a:pPr/>
-              <a:t>1/7/2015</a:t>
+              <a:t>13/7/2015</a:t>
             </a:fld>
             <a:endParaRPr lang="en-SG">
               <a:solidFill>
@@ -7643,7 +7643,7 @@
                 </a:solidFill>
               </a:rPr>
               <a:pPr/>
-              <a:t>1/7/2015</a:t>
+              <a:t>13/7/2015</a:t>
             </a:fld>
             <a:endParaRPr lang="en-SG">
               <a:solidFill>
@@ -7865,7 +7865,7 @@
                 </a:solidFill>
               </a:rPr>
               <a:pPr/>
-              <a:t>1/7/2015</a:t>
+              <a:t>13/7/2015</a:t>
             </a:fld>
             <a:endParaRPr lang="en-SG">
               <a:solidFill>
@@ -8083,7 +8083,7 @@
                 </a:solidFill>
               </a:rPr>
               <a:pPr/>
-              <a:t>1/7/2015</a:t>
+              <a:t>13/7/2015</a:t>
             </a:fld>
             <a:endParaRPr lang="en-SG">
               <a:solidFill>
@@ -8226,7 +8226,7 @@
           <a:p>
             <a:fld id="{9EC42EEE-3E5D-4D0F-A5A1-DBE4DDAAFE18}" type="datetimeFigureOut">
               <a:rPr lang="en-SG" smtClean="0"/>
-              <a:t>1/7/2015</a:t>
+              <a:t>13/7/2015</a:t>
             </a:fld>
             <a:endParaRPr lang="en-SG"/>
           </a:p>
@@ -8599,7 +8599,7 @@
           <a:p>
             <a:fld id="{9EC42EEE-3E5D-4D0F-A5A1-DBE4DDAAFE18}" type="datetimeFigureOut">
               <a:rPr lang="en-SG" smtClean="0"/>
-              <a:t>1/7/2015</a:t>
+              <a:t>13/7/2015</a:t>
             </a:fld>
             <a:endParaRPr lang="en-SG"/>
           </a:p>
@@ -8826,7 +8826,7 @@
           <a:p>
             <a:fld id="{9EC42EEE-3E5D-4D0F-A5A1-DBE4DDAAFE18}" type="datetimeFigureOut">
               <a:rPr lang="en-SG" smtClean="0"/>
-              <a:t>1/7/2015</a:t>
+              <a:t>13/7/2015</a:t>
             </a:fld>
             <a:endParaRPr lang="en-SG"/>
           </a:p>
@@ -8916,7 +8916,7 @@
           <a:p>
             <a:fld id="{9EC42EEE-3E5D-4D0F-A5A1-DBE4DDAAFE18}" type="datetimeFigureOut">
               <a:rPr lang="en-SG" smtClean="0"/>
-              <a:t>1/7/2015</a:t>
+              <a:t>13/7/2015</a:t>
             </a:fld>
             <a:endParaRPr lang="en-SG"/>
           </a:p>
@@ -9755,7 +9755,7 @@
           <a:p>
             <a:fld id="{9EC42EEE-3E5D-4D0F-A5A1-DBE4DDAAFE18}" type="datetimeFigureOut">
               <a:rPr lang="en-SG" smtClean="0"/>
-              <a:t>1/7/2015</a:t>
+              <a:t>13/7/2015</a:t>
             </a:fld>
             <a:endParaRPr lang="en-SG"/>
           </a:p>
@@ -10598,7 +10598,7 @@
           <a:p>
             <a:fld id="{9EC42EEE-3E5D-4D0F-A5A1-DBE4DDAAFE18}" type="datetimeFigureOut">
               <a:rPr lang="en-SG" smtClean="0"/>
-              <a:t>1/7/2015</a:t>
+              <a:t>13/7/2015</a:t>
             </a:fld>
             <a:endParaRPr lang="en-SG"/>
           </a:p>
@@ -11175,7 +11175,7 @@
           <a:p>
             <a:fld id="{9EC42EEE-3E5D-4D0F-A5A1-DBE4DDAAFE18}" type="datetimeFigureOut">
               <a:rPr lang="en-SG" smtClean="0"/>
-              <a:t>1/7/2015</a:t>
+              <a:t>13/7/2015</a:t>
             </a:fld>
             <a:endParaRPr lang="en-SG"/>
           </a:p>
@@ -13377,7 +13377,7 @@
         </p:nvSpPr>
         <p:spPr>
           <a:xfrm>
-            <a:off x="0" y="5657671"/>
+            <a:off x="0" y="6405135"/>
             <a:ext cx="9144000" cy="1200329"/>
           </a:xfrm>
           <a:prstGeom prst="rect">
@@ -13570,6 +13570,268 @@
           </a:p>
         </p:txBody>
       </p:sp>
+      <p:grpSp>
+        <p:nvGrpSpPr>
+          <p:cNvPr id="14" name="Unnamed Shape 20150713135318707214"/>
+          <p:cNvGrpSpPr/>
+          <p:nvPr/>
+        </p:nvGrpSpPr>
+        <p:grpSpPr>
+          <a:xfrm>
+            <a:off x="827584" y="5291916"/>
+            <a:ext cx="7488832" cy="657364"/>
+            <a:chOff x="827584" y="5291916"/>
+            <a:chExt cx="7488832" cy="657364"/>
+          </a:xfrm>
+        </p:grpSpPr>
+        <p:sp>
+          <p:nvSpPr>
+            <p:cNvPr id="9" name="Rectangle 8"/>
+            <p:cNvSpPr/>
+            <p:nvPr/>
+          </p:nvSpPr>
+          <p:spPr>
+            <a:xfrm>
+              <a:off x="5436096" y="5661248"/>
+              <a:ext cx="2376264" cy="288032"/>
+            </a:xfrm>
+            <a:prstGeom prst="rect">
+              <a:avLst/>
+            </a:prstGeom>
+            <a:noFill/>
+            <a:ln>
+              <a:solidFill>
+                <a:schemeClr val="bg1">
+                  <a:lumMod val="65000"/>
+                </a:schemeClr>
+              </a:solidFill>
+            </a:ln>
+          </p:spPr>
+          <p:style>
+            <a:lnRef idx="2">
+              <a:schemeClr val="accent1">
+                <a:shade val="50000"/>
+              </a:schemeClr>
+            </a:lnRef>
+            <a:fillRef idx="1">
+              <a:schemeClr val="accent1"/>
+            </a:fillRef>
+            <a:effectRef idx="0">
+              <a:schemeClr val="accent1"/>
+            </a:effectRef>
+            <a:fontRef idx="minor">
+              <a:schemeClr val="lt1"/>
+            </a:fontRef>
+          </p:style>
+          <p:txBody>
+            <a:bodyPr rtlCol="0" anchor="ctr"/>
+            <a:lstStyle/>
+            <a:p>
+              <a:pPr algn="ctr"/>
+              <a:r>
+                <a:rPr lang="en-US" dirty="0" smtClean="0">
+                  <a:solidFill>
+                    <a:schemeClr val="bg1">
+                      <a:lumMod val="65000"/>
+                    </a:schemeClr>
+                  </a:solidFill>
+                </a:rPr>
+                <a:t>2.5 months</a:t>
+              </a:r>
+              <a:endParaRPr lang="en-SG" dirty="0">
+                <a:solidFill>
+                  <a:schemeClr val="bg1">
+                    <a:lumMod val="65000"/>
+                  </a:schemeClr>
+                </a:solidFill>
+              </a:endParaRPr>
+            </a:p>
+          </p:txBody>
+        </p:sp>
+        <p:sp>
+          <p:nvSpPr>
+            <p:cNvPr id="12" name="TextBox 11"/>
+            <p:cNvSpPr txBox="1"/>
+            <p:nvPr/>
+          </p:nvSpPr>
+          <p:spPr>
+            <a:xfrm>
+              <a:off x="7251436" y="5291916"/>
+              <a:ext cx="1064980" cy="369332"/>
+            </a:xfrm>
+            <a:prstGeom prst="rect">
+              <a:avLst/>
+            </a:prstGeom>
+            <a:noFill/>
+          </p:spPr>
+          <p:txBody>
+            <a:bodyPr wrap="square" rtlCol="0">
+              <a:spAutoFit/>
+            </a:bodyPr>
+            <a:lstStyle/>
+            <a:p>
+              <a:pPr algn="r"/>
+              <a:r>
+                <a:rPr lang="en-US" dirty="0" smtClean="0">
+                  <a:solidFill>
+                    <a:schemeClr val="bg1">
+                      <a:lumMod val="65000"/>
+                    </a:schemeClr>
+                  </a:solidFill>
+                </a:rPr>
+                <a:t>Deadline</a:t>
+              </a:r>
+              <a:endParaRPr lang="en-SG" dirty="0">
+                <a:solidFill>
+                  <a:schemeClr val="bg1">
+                    <a:lumMod val="65000"/>
+                  </a:schemeClr>
+                </a:solidFill>
+              </a:endParaRPr>
+            </a:p>
+          </p:txBody>
+        </p:sp>
+        <p:sp>
+          <p:nvSpPr>
+            <p:cNvPr id="8" name="Pentagon 7"/>
+            <p:cNvSpPr/>
+            <p:nvPr/>
+          </p:nvSpPr>
+          <p:spPr>
+            <a:xfrm>
+              <a:off x="1187624" y="5661248"/>
+              <a:ext cx="4392488" cy="288032"/>
+            </a:xfrm>
+            <a:prstGeom prst="homePlate">
+              <a:avLst/>
+            </a:prstGeom>
+            <a:solidFill>
+              <a:schemeClr val="bg1">
+                <a:lumMod val="65000"/>
+              </a:schemeClr>
+            </a:solidFill>
+            <a:ln>
+              <a:solidFill>
+                <a:schemeClr val="bg1">
+                  <a:lumMod val="65000"/>
+                </a:schemeClr>
+              </a:solidFill>
+            </a:ln>
+          </p:spPr>
+          <p:style>
+            <a:lnRef idx="2">
+              <a:schemeClr val="accent1">
+                <a:shade val="50000"/>
+              </a:schemeClr>
+            </a:lnRef>
+            <a:fillRef idx="1">
+              <a:schemeClr val="accent1"/>
+            </a:fillRef>
+            <a:effectRef idx="0">
+              <a:schemeClr val="accent1"/>
+            </a:effectRef>
+            <a:fontRef idx="minor">
+              <a:schemeClr val="lt1"/>
+            </a:fontRef>
+          </p:style>
+          <p:txBody>
+            <a:bodyPr rtlCol="0" anchor="ctr"/>
+            <a:lstStyle/>
+            <a:p>
+              <a:pPr algn="ctr"/>
+              <a:r>
+                <a:rPr lang="en-US" dirty="0" smtClean="0"/>
+                <a:t>8 months</a:t>
+              </a:r>
+              <a:endParaRPr lang="en-SG" dirty="0"/>
+            </a:p>
+          </p:txBody>
+        </p:sp>
+        <p:sp>
+          <p:nvSpPr>
+            <p:cNvPr id="10" name="TextBox 9"/>
+            <p:cNvSpPr txBox="1"/>
+            <p:nvPr/>
+          </p:nvSpPr>
+          <p:spPr>
+            <a:xfrm>
+              <a:off x="827584" y="5301208"/>
+              <a:ext cx="963812" cy="369332"/>
+            </a:xfrm>
+            <a:prstGeom prst="rect">
+              <a:avLst/>
+            </a:prstGeom>
+            <a:noFill/>
+          </p:spPr>
+          <p:txBody>
+            <a:bodyPr wrap="square" rtlCol="0">
+              <a:spAutoFit/>
+            </a:bodyPr>
+            <a:lstStyle/>
+            <a:p>
+              <a:r>
+                <a:rPr lang="en-US" dirty="0" smtClean="0">
+                  <a:solidFill>
+                    <a:schemeClr val="bg1">
+                      <a:lumMod val="65000"/>
+                    </a:schemeClr>
+                  </a:solidFill>
+                </a:rPr>
+                <a:t>Kickoff</a:t>
+              </a:r>
+              <a:endParaRPr lang="en-SG" dirty="0">
+                <a:solidFill>
+                  <a:schemeClr val="bg1">
+                    <a:lumMod val="65000"/>
+                  </a:schemeClr>
+                </a:solidFill>
+              </a:endParaRPr>
+            </a:p>
+          </p:txBody>
+        </p:sp>
+        <p:sp>
+          <p:nvSpPr>
+            <p:cNvPr id="11" name="TextBox 10"/>
+            <p:cNvSpPr txBox="1"/>
+            <p:nvPr/>
+          </p:nvSpPr>
+          <p:spPr>
+            <a:xfrm>
+              <a:off x="5120356" y="5301208"/>
+              <a:ext cx="675780" cy="369332"/>
+            </a:xfrm>
+            <a:prstGeom prst="rect">
+              <a:avLst/>
+            </a:prstGeom>
+            <a:noFill/>
+          </p:spPr>
+          <p:txBody>
+            <a:bodyPr wrap="square" rtlCol="0">
+              <a:spAutoFit/>
+            </a:bodyPr>
+            <a:lstStyle/>
+            <a:p>
+              <a:r>
+                <a:rPr lang="en-US" dirty="0" smtClean="0">
+                  <a:solidFill>
+                    <a:schemeClr val="bg1">
+                      <a:lumMod val="65000"/>
+                    </a:schemeClr>
+                  </a:solidFill>
+                </a:rPr>
+                <a:t>Now</a:t>
+              </a:r>
+              <a:endParaRPr lang="en-SG" dirty="0">
+                <a:solidFill>
+                  <a:schemeClr val="bg1">
+                    <a:lumMod val="65000"/>
+                  </a:schemeClr>
+                </a:solidFill>
+              </a:endParaRPr>
+            </a:p>
+          </p:txBody>
+        </p:sp>
+      </p:grpSp>
     </p:spTree>
     <p:extLst>
       <p:ext uri="{BB962C8B-B14F-4D97-AF65-F5344CB8AC3E}">
@@ -14331,6 +14593,7 @@
               <a:rPr lang="en-SG"/>
               <a:t>Project Progress Report</a:t>
             </a:r>
+            <a:endParaRPr lang="en-SG"/>
           </a:p>
         </p:txBody>
       </p:sp>
@@ -14729,6 +14992,268 @@
               <a:endParaRPr lang="en-US" sz="2000" dirty="0">
                 <a:solidFill>
                   <a:srgbClr val="C00000"/>
+                </a:solidFill>
+              </a:endParaRPr>
+            </a:p>
+          </p:txBody>
+        </p:sp>
+      </p:grpSp>
+      <p:grpSp>
+        <p:nvGrpSpPr>
+          <p:cNvPr id="33" name="Unnamed Shape 20150713135318707214"/>
+          <p:cNvGrpSpPr/>
+          <p:nvPr/>
+        </p:nvGrpSpPr>
+        <p:grpSpPr>
+          <a:xfrm>
+            <a:off x="827584" y="5291916"/>
+            <a:ext cx="7488832" cy="657364"/>
+            <a:chOff x="827584" y="5291916"/>
+            <a:chExt cx="7488832" cy="657364"/>
+          </a:xfrm>
+        </p:grpSpPr>
+        <p:sp>
+          <p:nvSpPr>
+            <p:cNvPr id="34" name="Rectangle 33"/>
+            <p:cNvSpPr/>
+            <p:nvPr/>
+          </p:nvSpPr>
+          <p:spPr>
+            <a:xfrm>
+              <a:off x="5436096" y="5661248"/>
+              <a:ext cx="2376264" cy="288032"/>
+            </a:xfrm>
+            <a:prstGeom prst="rect">
+              <a:avLst/>
+            </a:prstGeom>
+            <a:noFill/>
+            <a:ln>
+              <a:solidFill>
+                <a:schemeClr val="bg1">
+                  <a:lumMod val="65000"/>
+                </a:schemeClr>
+              </a:solidFill>
+            </a:ln>
+          </p:spPr>
+          <p:style>
+            <a:lnRef idx="2">
+              <a:schemeClr val="accent1">
+                <a:shade val="50000"/>
+              </a:schemeClr>
+            </a:lnRef>
+            <a:fillRef idx="1">
+              <a:schemeClr val="accent1"/>
+            </a:fillRef>
+            <a:effectRef idx="0">
+              <a:schemeClr val="accent1"/>
+            </a:effectRef>
+            <a:fontRef idx="minor">
+              <a:schemeClr val="lt1"/>
+            </a:fontRef>
+          </p:style>
+          <p:txBody>
+            <a:bodyPr rtlCol="0" anchor="ctr"/>
+            <a:lstStyle/>
+            <a:p>
+              <a:pPr algn="ctr"/>
+              <a:r>
+                <a:rPr lang="en-US" dirty="0" smtClean="0">
+                  <a:solidFill>
+                    <a:schemeClr val="bg1">
+                      <a:lumMod val="65000"/>
+                    </a:schemeClr>
+                  </a:solidFill>
+                </a:rPr>
+                <a:t>2.5 months</a:t>
+              </a:r>
+              <a:endParaRPr lang="en-SG" dirty="0">
+                <a:solidFill>
+                  <a:schemeClr val="bg1">
+                    <a:lumMod val="65000"/>
+                  </a:schemeClr>
+                </a:solidFill>
+              </a:endParaRPr>
+            </a:p>
+          </p:txBody>
+        </p:sp>
+        <p:sp>
+          <p:nvSpPr>
+            <p:cNvPr id="35" name="TextBox 34"/>
+            <p:cNvSpPr txBox="1"/>
+            <p:nvPr/>
+          </p:nvSpPr>
+          <p:spPr>
+            <a:xfrm>
+              <a:off x="7251436" y="5291916"/>
+              <a:ext cx="1064980" cy="369332"/>
+            </a:xfrm>
+            <a:prstGeom prst="rect">
+              <a:avLst/>
+            </a:prstGeom>
+            <a:noFill/>
+          </p:spPr>
+          <p:txBody>
+            <a:bodyPr wrap="square" rtlCol="0">
+              <a:spAutoFit/>
+            </a:bodyPr>
+            <a:lstStyle/>
+            <a:p>
+              <a:pPr algn="r"/>
+              <a:r>
+                <a:rPr lang="en-US" dirty="0" smtClean="0">
+                  <a:solidFill>
+                    <a:schemeClr val="bg1">
+                      <a:lumMod val="65000"/>
+                    </a:schemeClr>
+                  </a:solidFill>
+                </a:rPr>
+                <a:t>Deadline</a:t>
+              </a:r>
+              <a:endParaRPr lang="en-SG" dirty="0">
+                <a:solidFill>
+                  <a:schemeClr val="bg1">
+                    <a:lumMod val="65000"/>
+                  </a:schemeClr>
+                </a:solidFill>
+              </a:endParaRPr>
+            </a:p>
+          </p:txBody>
+        </p:sp>
+        <p:sp>
+          <p:nvSpPr>
+            <p:cNvPr id="36" name="Pentagon 35"/>
+            <p:cNvSpPr/>
+            <p:nvPr/>
+          </p:nvSpPr>
+          <p:spPr>
+            <a:xfrm>
+              <a:off x="1187624" y="5661248"/>
+              <a:ext cx="4392488" cy="288032"/>
+            </a:xfrm>
+            <a:prstGeom prst="homePlate">
+              <a:avLst/>
+            </a:prstGeom>
+            <a:solidFill>
+              <a:schemeClr val="bg1">
+                <a:lumMod val="65000"/>
+              </a:schemeClr>
+            </a:solidFill>
+            <a:ln>
+              <a:solidFill>
+                <a:schemeClr val="bg1">
+                  <a:lumMod val="65000"/>
+                </a:schemeClr>
+              </a:solidFill>
+            </a:ln>
+          </p:spPr>
+          <p:style>
+            <a:lnRef idx="2">
+              <a:schemeClr val="accent1">
+                <a:shade val="50000"/>
+              </a:schemeClr>
+            </a:lnRef>
+            <a:fillRef idx="1">
+              <a:schemeClr val="accent1"/>
+            </a:fillRef>
+            <a:effectRef idx="0">
+              <a:schemeClr val="accent1"/>
+            </a:effectRef>
+            <a:fontRef idx="minor">
+              <a:schemeClr val="lt1"/>
+            </a:fontRef>
+          </p:style>
+          <p:txBody>
+            <a:bodyPr rtlCol="0" anchor="ctr"/>
+            <a:lstStyle/>
+            <a:p>
+              <a:pPr algn="ctr"/>
+              <a:r>
+                <a:rPr lang="en-US" dirty="0" smtClean="0"/>
+                <a:t>8 months</a:t>
+              </a:r>
+              <a:endParaRPr lang="en-SG" dirty="0"/>
+            </a:p>
+          </p:txBody>
+        </p:sp>
+        <p:sp>
+          <p:nvSpPr>
+            <p:cNvPr id="37" name="TextBox 36"/>
+            <p:cNvSpPr txBox="1"/>
+            <p:nvPr/>
+          </p:nvSpPr>
+          <p:spPr>
+            <a:xfrm>
+              <a:off x="827584" y="5301208"/>
+              <a:ext cx="963812" cy="369332"/>
+            </a:xfrm>
+            <a:prstGeom prst="rect">
+              <a:avLst/>
+            </a:prstGeom>
+            <a:noFill/>
+          </p:spPr>
+          <p:txBody>
+            <a:bodyPr wrap="square" rtlCol="0">
+              <a:spAutoFit/>
+            </a:bodyPr>
+            <a:lstStyle/>
+            <a:p>
+              <a:r>
+                <a:rPr lang="en-US" dirty="0" smtClean="0">
+                  <a:solidFill>
+                    <a:schemeClr val="bg1">
+                      <a:lumMod val="65000"/>
+                    </a:schemeClr>
+                  </a:solidFill>
+                </a:rPr>
+                <a:t>Kickoff</a:t>
+              </a:r>
+              <a:endParaRPr lang="en-SG" dirty="0">
+                <a:solidFill>
+                  <a:schemeClr val="bg1">
+                    <a:lumMod val="65000"/>
+                  </a:schemeClr>
+                </a:solidFill>
+              </a:endParaRPr>
+            </a:p>
+          </p:txBody>
+        </p:sp>
+        <p:sp>
+          <p:nvSpPr>
+            <p:cNvPr id="38" name="TextBox 37"/>
+            <p:cNvSpPr txBox="1"/>
+            <p:nvPr/>
+          </p:nvSpPr>
+          <p:spPr>
+            <a:xfrm>
+              <a:off x="5120356" y="5301208"/>
+              <a:ext cx="675780" cy="369332"/>
+            </a:xfrm>
+            <a:prstGeom prst="rect">
+              <a:avLst/>
+            </a:prstGeom>
+            <a:noFill/>
+          </p:spPr>
+          <p:txBody>
+            <a:bodyPr wrap="square" rtlCol="0">
+              <a:spAutoFit/>
+            </a:bodyPr>
+            <a:lstStyle/>
+            <a:p>
+              <a:r>
+                <a:rPr lang="en-US" dirty="0" smtClean="0">
+                  <a:solidFill>
+                    <a:schemeClr val="bg1">
+                      <a:lumMod val="65000"/>
+                    </a:schemeClr>
+                  </a:solidFill>
+                </a:rPr>
+                <a:t>Now</a:t>
+              </a:r>
+              <a:endParaRPr lang="en-SG" dirty="0">
+                <a:solidFill>
+                  <a:schemeClr val="bg1">
+                    <a:lumMod val="65000"/>
+                  </a:schemeClr>
                 </a:solidFill>
               </a:endParaRPr>
             </a:p>
@@ -15045,6 +15570,7 @@
               <a:rPr lang="en-SG"/>
               <a:t>Project Progress Report</a:t>
             </a:r>
+            <a:endParaRPr lang="en-SG"/>
           </a:p>
         </p:txBody>
       </p:sp>
@@ -15299,6 +15825,268 @@
           </a:p>
         </p:txBody>
       </p:sp>
+      <p:grpSp>
+        <p:nvGrpSpPr>
+          <p:cNvPr id="29" name="Unnamed Shape 20150713135318707214"/>
+          <p:cNvGrpSpPr/>
+          <p:nvPr/>
+        </p:nvGrpSpPr>
+        <p:grpSpPr>
+          <a:xfrm>
+            <a:off x="827584" y="5291916"/>
+            <a:ext cx="7488832" cy="657364"/>
+            <a:chOff x="827584" y="5291916"/>
+            <a:chExt cx="7488832" cy="657364"/>
+          </a:xfrm>
+        </p:grpSpPr>
+        <p:sp>
+          <p:nvSpPr>
+            <p:cNvPr id="30" name="Rectangle 29"/>
+            <p:cNvSpPr/>
+            <p:nvPr/>
+          </p:nvSpPr>
+          <p:spPr>
+            <a:xfrm>
+              <a:off x="5436096" y="5661248"/>
+              <a:ext cx="2376264" cy="288032"/>
+            </a:xfrm>
+            <a:prstGeom prst="rect">
+              <a:avLst/>
+            </a:prstGeom>
+            <a:noFill/>
+            <a:ln>
+              <a:solidFill>
+                <a:schemeClr val="bg1">
+                  <a:lumMod val="65000"/>
+                </a:schemeClr>
+              </a:solidFill>
+            </a:ln>
+          </p:spPr>
+          <p:style>
+            <a:lnRef idx="2">
+              <a:schemeClr val="accent1">
+                <a:shade val="50000"/>
+              </a:schemeClr>
+            </a:lnRef>
+            <a:fillRef idx="1">
+              <a:schemeClr val="accent1"/>
+            </a:fillRef>
+            <a:effectRef idx="0">
+              <a:schemeClr val="accent1"/>
+            </a:effectRef>
+            <a:fontRef idx="minor">
+              <a:schemeClr val="lt1"/>
+            </a:fontRef>
+          </p:style>
+          <p:txBody>
+            <a:bodyPr rtlCol="0" anchor="ctr"/>
+            <a:lstStyle/>
+            <a:p>
+              <a:pPr algn="ctr"/>
+              <a:r>
+                <a:rPr lang="en-US" dirty="0" smtClean="0">
+                  <a:solidFill>
+                    <a:schemeClr val="bg1">
+                      <a:lumMod val="65000"/>
+                    </a:schemeClr>
+                  </a:solidFill>
+                </a:rPr>
+                <a:t>2.5 months</a:t>
+              </a:r>
+              <a:endParaRPr lang="en-SG" dirty="0">
+                <a:solidFill>
+                  <a:schemeClr val="bg1">
+                    <a:lumMod val="65000"/>
+                  </a:schemeClr>
+                </a:solidFill>
+              </a:endParaRPr>
+            </a:p>
+          </p:txBody>
+        </p:sp>
+        <p:sp>
+          <p:nvSpPr>
+            <p:cNvPr id="31" name="TextBox 30"/>
+            <p:cNvSpPr txBox="1"/>
+            <p:nvPr/>
+          </p:nvSpPr>
+          <p:spPr>
+            <a:xfrm>
+              <a:off x="7251436" y="5291916"/>
+              <a:ext cx="1064980" cy="369332"/>
+            </a:xfrm>
+            <a:prstGeom prst="rect">
+              <a:avLst/>
+            </a:prstGeom>
+            <a:noFill/>
+          </p:spPr>
+          <p:txBody>
+            <a:bodyPr wrap="square" rtlCol="0">
+              <a:spAutoFit/>
+            </a:bodyPr>
+            <a:lstStyle/>
+            <a:p>
+              <a:pPr algn="r"/>
+              <a:r>
+                <a:rPr lang="en-US" dirty="0" smtClean="0">
+                  <a:solidFill>
+                    <a:schemeClr val="bg1">
+                      <a:lumMod val="65000"/>
+                    </a:schemeClr>
+                  </a:solidFill>
+                </a:rPr>
+                <a:t>Deadline</a:t>
+              </a:r>
+              <a:endParaRPr lang="en-SG" dirty="0">
+                <a:solidFill>
+                  <a:schemeClr val="bg1">
+                    <a:lumMod val="65000"/>
+                  </a:schemeClr>
+                </a:solidFill>
+              </a:endParaRPr>
+            </a:p>
+          </p:txBody>
+        </p:sp>
+        <p:sp>
+          <p:nvSpPr>
+            <p:cNvPr id="32" name="Pentagon 31"/>
+            <p:cNvSpPr/>
+            <p:nvPr/>
+          </p:nvSpPr>
+          <p:spPr>
+            <a:xfrm>
+              <a:off x="1187624" y="5661248"/>
+              <a:ext cx="4392488" cy="288032"/>
+            </a:xfrm>
+            <a:prstGeom prst="homePlate">
+              <a:avLst/>
+            </a:prstGeom>
+            <a:solidFill>
+              <a:schemeClr val="bg1">
+                <a:lumMod val="65000"/>
+              </a:schemeClr>
+            </a:solidFill>
+            <a:ln>
+              <a:solidFill>
+                <a:schemeClr val="bg1">
+                  <a:lumMod val="65000"/>
+                </a:schemeClr>
+              </a:solidFill>
+            </a:ln>
+          </p:spPr>
+          <p:style>
+            <a:lnRef idx="2">
+              <a:schemeClr val="accent1">
+                <a:shade val="50000"/>
+              </a:schemeClr>
+            </a:lnRef>
+            <a:fillRef idx="1">
+              <a:schemeClr val="accent1"/>
+            </a:fillRef>
+            <a:effectRef idx="0">
+              <a:schemeClr val="accent1"/>
+            </a:effectRef>
+            <a:fontRef idx="minor">
+              <a:schemeClr val="lt1"/>
+            </a:fontRef>
+          </p:style>
+          <p:txBody>
+            <a:bodyPr rtlCol="0" anchor="ctr"/>
+            <a:lstStyle/>
+            <a:p>
+              <a:pPr algn="ctr"/>
+              <a:r>
+                <a:rPr lang="en-US" dirty="0" smtClean="0"/>
+                <a:t>8 months</a:t>
+              </a:r>
+              <a:endParaRPr lang="en-SG" dirty="0"/>
+            </a:p>
+          </p:txBody>
+        </p:sp>
+        <p:sp>
+          <p:nvSpPr>
+            <p:cNvPr id="33" name="TextBox 32"/>
+            <p:cNvSpPr txBox="1"/>
+            <p:nvPr/>
+          </p:nvSpPr>
+          <p:spPr>
+            <a:xfrm>
+              <a:off x="827584" y="5301208"/>
+              <a:ext cx="963812" cy="369332"/>
+            </a:xfrm>
+            <a:prstGeom prst="rect">
+              <a:avLst/>
+            </a:prstGeom>
+            <a:noFill/>
+          </p:spPr>
+          <p:txBody>
+            <a:bodyPr wrap="square" rtlCol="0">
+              <a:spAutoFit/>
+            </a:bodyPr>
+            <a:lstStyle/>
+            <a:p>
+              <a:r>
+                <a:rPr lang="en-US" dirty="0" smtClean="0">
+                  <a:solidFill>
+                    <a:schemeClr val="bg1">
+                      <a:lumMod val="65000"/>
+                    </a:schemeClr>
+                  </a:solidFill>
+                </a:rPr>
+                <a:t>Kickoff</a:t>
+              </a:r>
+              <a:endParaRPr lang="en-SG" dirty="0">
+                <a:solidFill>
+                  <a:schemeClr val="bg1">
+                    <a:lumMod val="65000"/>
+                  </a:schemeClr>
+                </a:solidFill>
+              </a:endParaRPr>
+            </a:p>
+          </p:txBody>
+        </p:sp>
+        <p:sp>
+          <p:nvSpPr>
+            <p:cNvPr id="34" name="TextBox 33"/>
+            <p:cNvSpPr txBox="1"/>
+            <p:nvPr/>
+          </p:nvSpPr>
+          <p:spPr>
+            <a:xfrm>
+              <a:off x="5120356" y="5301208"/>
+              <a:ext cx="675780" cy="369332"/>
+            </a:xfrm>
+            <a:prstGeom prst="rect">
+              <a:avLst/>
+            </a:prstGeom>
+            <a:noFill/>
+          </p:spPr>
+          <p:txBody>
+            <a:bodyPr wrap="square" rtlCol="0">
+              <a:spAutoFit/>
+            </a:bodyPr>
+            <a:lstStyle/>
+            <a:p>
+              <a:r>
+                <a:rPr lang="en-US" dirty="0" smtClean="0">
+                  <a:solidFill>
+                    <a:schemeClr val="bg1">
+                      <a:lumMod val="65000"/>
+                    </a:schemeClr>
+                  </a:solidFill>
+                </a:rPr>
+                <a:t>Now</a:t>
+              </a:r>
+              <a:endParaRPr lang="en-SG" dirty="0">
+                <a:solidFill>
+                  <a:schemeClr val="bg1">
+                    <a:lumMod val="65000"/>
+                  </a:schemeClr>
+                </a:solidFill>
+              </a:endParaRPr>
+            </a:p>
+          </p:txBody>
+        </p:sp>
+      </p:grpSp>
     </p:spTree>
     <p:extLst>
       <p:ext uri="{BB962C8B-B14F-4D97-AF65-F5344CB8AC3E}">
@@ -16052,6 +16840,7 @@
               <a:rPr lang="en-SG"/>
               <a:t>Project Progress Report</a:t>
             </a:r>
+            <a:endParaRPr lang="en-SG"/>
           </a:p>
         </p:txBody>
       </p:sp>
@@ -16306,6 +17095,268 @@
           </a:p>
         </p:txBody>
       </p:sp>
+      <p:grpSp>
+        <p:nvGrpSpPr>
+          <p:cNvPr id="29" name="Unnamed Shape 20150713135318707214"/>
+          <p:cNvGrpSpPr/>
+          <p:nvPr/>
+        </p:nvGrpSpPr>
+        <p:grpSpPr>
+          <a:xfrm>
+            <a:off x="827584" y="5291916"/>
+            <a:ext cx="7488832" cy="657364"/>
+            <a:chOff x="827584" y="5291916"/>
+            <a:chExt cx="7488832" cy="657364"/>
+          </a:xfrm>
+        </p:grpSpPr>
+        <p:sp>
+          <p:nvSpPr>
+            <p:cNvPr id="30" name="Rectangle 29"/>
+            <p:cNvSpPr/>
+            <p:nvPr/>
+          </p:nvSpPr>
+          <p:spPr>
+            <a:xfrm>
+              <a:off x="5436096" y="5661248"/>
+              <a:ext cx="2376264" cy="288032"/>
+            </a:xfrm>
+            <a:prstGeom prst="rect">
+              <a:avLst/>
+            </a:prstGeom>
+            <a:noFill/>
+            <a:ln>
+              <a:solidFill>
+                <a:schemeClr val="bg1">
+                  <a:lumMod val="65000"/>
+                </a:schemeClr>
+              </a:solidFill>
+            </a:ln>
+          </p:spPr>
+          <p:style>
+            <a:lnRef idx="2">
+              <a:schemeClr val="accent1">
+                <a:shade val="50000"/>
+              </a:schemeClr>
+            </a:lnRef>
+            <a:fillRef idx="1">
+              <a:schemeClr val="accent1"/>
+            </a:fillRef>
+            <a:effectRef idx="0">
+              <a:schemeClr val="accent1"/>
+            </a:effectRef>
+            <a:fontRef idx="minor">
+              <a:schemeClr val="lt1"/>
+            </a:fontRef>
+          </p:style>
+          <p:txBody>
+            <a:bodyPr rtlCol="0" anchor="ctr"/>
+            <a:lstStyle/>
+            <a:p>
+              <a:pPr algn="ctr"/>
+              <a:r>
+                <a:rPr lang="en-US" dirty="0" smtClean="0">
+                  <a:solidFill>
+                    <a:schemeClr val="bg1">
+                      <a:lumMod val="65000"/>
+                    </a:schemeClr>
+                  </a:solidFill>
+                </a:rPr>
+                <a:t>2.5 months</a:t>
+              </a:r>
+              <a:endParaRPr lang="en-SG" dirty="0">
+                <a:solidFill>
+                  <a:schemeClr val="bg1">
+                    <a:lumMod val="65000"/>
+                  </a:schemeClr>
+                </a:solidFill>
+              </a:endParaRPr>
+            </a:p>
+          </p:txBody>
+        </p:sp>
+        <p:sp>
+          <p:nvSpPr>
+            <p:cNvPr id="31" name="TextBox 30"/>
+            <p:cNvSpPr txBox="1"/>
+            <p:nvPr/>
+          </p:nvSpPr>
+          <p:spPr>
+            <a:xfrm>
+              <a:off x="7251436" y="5291916"/>
+              <a:ext cx="1064980" cy="369332"/>
+            </a:xfrm>
+            <a:prstGeom prst="rect">
+              <a:avLst/>
+            </a:prstGeom>
+            <a:noFill/>
+          </p:spPr>
+          <p:txBody>
+            <a:bodyPr wrap="square" rtlCol="0">
+              <a:spAutoFit/>
+            </a:bodyPr>
+            <a:lstStyle/>
+            <a:p>
+              <a:pPr algn="r"/>
+              <a:r>
+                <a:rPr lang="en-US" dirty="0" smtClean="0">
+                  <a:solidFill>
+                    <a:schemeClr val="bg1">
+                      <a:lumMod val="65000"/>
+                    </a:schemeClr>
+                  </a:solidFill>
+                </a:rPr>
+                <a:t>Deadline</a:t>
+              </a:r>
+              <a:endParaRPr lang="en-SG" dirty="0">
+                <a:solidFill>
+                  <a:schemeClr val="bg1">
+                    <a:lumMod val="65000"/>
+                  </a:schemeClr>
+                </a:solidFill>
+              </a:endParaRPr>
+            </a:p>
+          </p:txBody>
+        </p:sp>
+        <p:sp>
+          <p:nvSpPr>
+            <p:cNvPr id="32" name="Pentagon 31"/>
+            <p:cNvSpPr/>
+            <p:nvPr/>
+          </p:nvSpPr>
+          <p:spPr>
+            <a:xfrm>
+              <a:off x="1187624" y="5661248"/>
+              <a:ext cx="4392488" cy="288032"/>
+            </a:xfrm>
+            <a:prstGeom prst="homePlate">
+              <a:avLst/>
+            </a:prstGeom>
+            <a:solidFill>
+              <a:schemeClr val="bg1">
+                <a:lumMod val="65000"/>
+              </a:schemeClr>
+            </a:solidFill>
+            <a:ln>
+              <a:solidFill>
+                <a:schemeClr val="bg1">
+                  <a:lumMod val="65000"/>
+                </a:schemeClr>
+              </a:solidFill>
+            </a:ln>
+          </p:spPr>
+          <p:style>
+            <a:lnRef idx="2">
+              <a:schemeClr val="accent1">
+                <a:shade val="50000"/>
+              </a:schemeClr>
+            </a:lnRef>
+            <a:fillRef idx="1">
+              <a:schemeClr val="accent1"/>
+            </a:fillRef>
+            <a:effectRef idx="0">
+              <a:schemeClr val="accent1"/>
+            </a:effectRef>
+            <a:fontRef idx="minor">
+              <a:schemeClr val="lt1"/>
+            </a:fontRef>
+          </p:style>
+          <p:txBody>
+            <a:bodyPr rtlCol="0" anchor="ctr"/>
+            <a:lstStyle/>
+            <a:p>
+              <a:pPr algn="ctr"/>
+              <a:r>
+                <a:rPr lang="en-US" dirty="0" smtClean="0"/>
+                <a:t>8 months</a:t>
+              </a:r>
+              <a:endParaRPr lang="en-SG" dirty="0"/>
+            </a:p>
+          </p:txBody>
+        </p:sp>
+        <p:sp>
+          <p:nvSpPr>
+            <p:cNvPr id="33" name="TextBox 32"/>
+            <p:cNvSpPr txBox="1"/>
+            <p:nvPr/>
+          </p:nvSpPr>
+          <p:spPr>
+            <a:xfrm>
+              <a:off x="827584" y="5301208"/>
+              <a:ext cx="963812" cy="369332"/>
+            </a:xfrm>
+            <a:prstGeom prst="rect">
+              <a:avLst/>
+            </a:prstGeom>
+            <a:noFill/>
+          </p:spPr>
+          <p:txBody>
+            <a:bodyPr wrap="square" rtlCol="0">
+              <a:spAutoFit/>
+            </a:bodyPr>
+            <a:lstStyle/>
+            <a:p>
+              <a:r>
+                <a:rPr lang="en-US" dirty="0" smtClean="0">
+                  <a:solidFill>
+                    <a:schemeClr val="bg1">
+                      <a:lumMod val="65000"/>
+                    </a:schemeClr>
+                  </a:solidFill>
+                </a:rPr>
+                <a:t>Kickoff</a:t>
+              </a:r>
+              <a:endParaRPr lang="en-SG" dirty="0">
+                <a:solidFill>
+                  <a:schemeClr val="bg1">
+                    <a:lumMod val="65000"/>
+                  </a:schemeClr>
+                </a:solidFill>
+              </a:endParaRPr>
+            </a:p>
+          </p:txBody>
+        </p:sp>
+        <p:sp>
+          <p:nvSpPr>
+            <p:cNvPr id="34" name="TextBox 33"/>
+            <p:cNvSpPr txBox="1"/>
+            <p:nvPr/>
+          </p:nvSpPr>
+          <p:spPr>
+            <a:xfrm>
+              <a:off x="5120356" y="5301208"/>
+              <a:ext cx="675780" cy="369332"/>
+            </a:xfrm>
+            <a:prstGeom prst="rect">
+              <a:avLst/>
+            </a:prstGeom>
+            <a:noFill/>
+          </p:spPr>
+          <p:txBody>
+            <a:bodyPr wrap="square" rtlCol="0">
+              <a:spAutoFit/>
+            </a:bodyPr>
+            <a:lstStyle/>
+            <a:p>
+              <a:r>
+                <a:rPr lang="en-US" dirty="0" smtClean="0">
+                  <a:solidFill>
+                    <a:schemeClr val="bg1">
+                      <a:lumMod val="65000"/>
+                    </a:schemeClr>
+                  </a:solidFill>
+                </a:rPr>
+                <a:t>Now</a:t>
+              </a:r>
+              <a:endParaRPr lang="en-SG" dirty="0">
+                <a:solidFill>
+                  <a:schemeClr val="bg1">
+                    <a:lumMod val="65000"/>
+                  </a:schemeClr>
+                </a:solidFill>
+              </a:endParaRPr>
+            </a:p>
+          </p:txBody>
+        </p:sp>
+      </p:grpSp>
     </p:spTree>
     <p:extLst>
       <p:ext uri="{BB962C8B-B14F-4D97-AF65-F5344CB8AC3E}">
@@ -16572,6 +17623,7 @@
               <a:rPr lang="en-SG"/>
               <a:t>Project Progress Report</a:t>
             </a:r>
+            <a:endParaRPr lang="en-SG"/>
           </a:p>
         </p:txBody>
       </p:sp>
@@ -16820,6 +17872,268 @@
           </a:p>
         </p:txBody>
       </p:sp>
+      <p:grpSp>
+        <p:nvGrpSpPr>
+          <p:cNvPr id="29" name="Unnamed Shape 20150713135318707214"/>
+          <p:cNvGrpSpPr/>
+          <p:nvPr/>
+        </p:nvGrpSpPr>
+        <p:grpSpPr>
+          <a:xfrm>
+            <a:off x="827584" y="5291916"/>
+            <a:ext cx="7488832" cy="657364"/>
+            <a:chOff x="827584" y="5291916"/>
+            <a:chExt cx="7488832" cy="657364"/>
+          </a:xfrm>
+        </p:grpSpPr>
+        <p:sp>
+          <p:nvSpPr>
+            <p:cNvPr id="30" name="Rectangle 29"/>
+            <p:cNvSpPr/>
+            <p:nvPr/>
+          </p:nvSpPr>
+          <p:spPr>
+            <a:xfrm>
+              <a:off x="5436096" y="5661248"/>
+              <a:ext cx="2376264" cy="288032"/>
+            </a:xfrm>
+            <a:prstGeom prst="rect">
+              <a:avLst/>
+            </a:prstGeom>
+            <a:noFill/>
+            <a:ln>
+              <a:solidFill>
+                <a:schemeClr val="bg1">
+                  <a:lumMod val="65000"/>
+                </a:schemeClr>
+              </a:solidFill>
+            </a:ln>
+          </p:spPr>
+          <p:style>
+            <a:lnRef idx="2">
+              <a:schemeClr val="accent1">
+                <a:shade val="50000"/>
+              </a:schemeClr>
+            </a:lnRef>
+            <a:fillRef idx="1">
+              <a:schemeClr val="accent1"/>
+            </a:fillRef>
+            <a:effectRef idx="0">
+              <a:schemeClr val="accent1"/>
+            </a:effectRef>
+            <a:fontRef idx="minor">
+              <a:schemeClr val="lt1"/>
+            </a:fontRef>
+          </p:style>
+          <p:txBody>
+            <a:bodyPr rtlCol="0" anchor="ctr"/>
+            <a:lstStyle/>
+            <a:p>
+              <a:pPr algn="ctr"/>
+              <a:r>
+                <a:rPr lang="en-US" dirty="0" smtClean="0">
+                  <a:solidFill>
+                    <a:schemeClr val="bg1">
+                      <a:lumMod val="65000"/>
+                    </a:schemeClr>
+                  </a:solidFill>
+                </a:rPr>
+                <a:t>2.5 months</a:t>
+              </a:r>
+              <a:endParaRPr lang="en-SG" dirty="0">
+                <a:solidFill>
+                  <a:schemeClr val="bg1">
+                    <a:lumMod val="65000"/>
+                  </a:schemeClr>
+                </a:solidFill>
+              </a:endParaRPr>
+            </a:p>
+          </p:txBody>
+        </p:sp>
+        <p:sp>
+          <p:nvSpPr>
+            <p:cNvPr id="31" name="TextBox 30"/>
+            <p:cNvSpPr txBox="1"/>
+            <p:nvPr/>
+          </p:nvSpPr>
+          <p:spPr>
+            <a:xfrm>
+              <a:off x="7251436" y="5291916"/>
+              <a:ext cx="1064980" cy="369332"/>
+            </a:xfrm>
+            <a:prstGeom prst="rect">
+              <a:avLst/>
+            </a:prstGeom>
+            <a:noFill/>
+          </p:spPr>
+          <p:txBody>
+            <a:bodyPr wrap="square" rtlCol="0">
+              <a:spAutoFit/>
+            </a:bodyPr>
+            <a:lstStyle/>
+            <a:p>
+              <a:pPr algn="r"/>
+              <a:r>
+                <a:rPr lang="en-US" dirty="0" smtClean="0">
+                  <a:solidFill>
+                    <a:schemeClr val="bg1">
+                      <a:lumMod val="65000"/>
+                    </a:schemeClr>
+                  </a:solidFill>
+                </a:rPr>
+                <a:t>Deadline</a:t>
+              </a:r>
+              <a:endParaRPr lang="en-SG" dirty="0">
+                <a:solidFill>
+                  <a:schemeClr val="bg1">
+                    <a:lumMod val="65000"/>
+                  </a:schemeClr>
+                </a:solidFill>
+              </a:endParaRPr>
+            </a:p>
+          </p:txBody>
+        </p:sp>
+        <p:sp>
+          <p:nvSpPr>
+            <p:cNvPr id="32" name="Pentagon 31"/>
+            <p:cNvSpPr/>
+            <p:nvPr/>
+          </p:nvSpPr>
+          <p:spPr>
+            <a:xfrm>
+              <a:off x="1187624" y="5661248"/>
+              <a:ext cx="4392488" cy="288032"/>
+            </a:xfrm>
+            <a:prstGeom prst="homePlate">
+              <a:avLst/>
+            </a:prstGeom>
+            <a:solidFill>
+              <a:schemeClr val="bg1">
+                <a:lumMod val="65000"/>
+              </a:schemeClr>
+            </a:solidFill>
+            <a:ln>
+              <a:solidFill>
+                <a:schemeClr val="bg1">
+                  <a:lumMod val="65000"/>
+                </a:schemeClr>
+              </a:solidFill>
+            </a:ln>
+          </p:spPr>
+          <p:style>
+            <a:lnRef idx="2">
+              <a:schemeClr val="accent1">
+                <a:shade val="50000"/>
+              </a:schemeClr>
+            </a:lnRef>
+            <a:fillRef idx="1">
+              <a:schemeClr val="accent1"/>
+            </a:fillRef>
+            <a:effectRef idx="0">
+              <a:schemeClr val="accent1"/>
+            </a:effectRef>
+            <a:fontRef idx="minor">
+              <a:schemeClr val="lt1"/>
+            </a:fontRef>
+          </p:style>
+          <p:txBody>
+            <a:bodyPr rtlCol="0" anchor="ctr"/>
+            <a:lstStyle/>
+            <a:p>
+              <a:pPr algn="ctr"/>
+              <a:r>
+                <a:rPr lang="en-US" dirty="0" smtClean="0"/>
+                <a:t>8 months</a:t>
+              </a:r>
+              <a:endParaRPr lang="en-SG" dirty="0"/>
+            </a:p>
+          </p:txBody>
+        </p:sp>
+        <p:sp>
+          <p:nvSpPr>
+            <p:cNvPr id="33" name="TextBox 32"/>
+            <p:cNvSpPr txBox="1"/>
+            <p:nvPr/>
+          </p:nvSpPr>
+          <p:spPr>
+            <a:xfrm>
+              <a:off x="827584" y="5301208"/>
+              <a:ext cx="963812" cy="369332"/>
+            </a:xfrm>
+            <a:prstGeom prst="rect">
+              <a:avLst/>
+            </a:prstGeom>
+            <a:noFill/>
+          </p:spPr>
+          <p:txBody>
+            <a:bodyPr wrap="square" rtlCol="0">
+              <a:spAutoFit/>
+            </a:bodyPr>
+            <a:lstStyle/>
+            <a:p>
+              <a:r>
+                <a:rPr lang="en-US" dirty="0" smtClean="0">
+                  <a:solidFill>
+                    <a:schemeClr val="bg1">
+                      <a:lumMod val="65000"/>
+                    </a:schemeClr>
+                  </a:solidFill>
+                </a:rPr>
+                <a:t>Kickoff</a:t>
+              </a:r>
+              <a:endParaRPr lang="en-SG" dirty="0">
+                <a:solidFill>
+                  <a:schemeClr val="bg1">
+                    <a:lumMod val="65000"/>
+                  </a:schemeClr>
+                </a:solidFill>
+              </a:endParaRPr>
+            </a:p>
+          </p:txBody>
+        </p:sp>
+        <p:sp>
+          <p:nvSpPr>
+            <p:cNvPr id="34" name="TextBox 33"/>
+            <p:cNvSpPr txBox="1"/>
+            <p:nvPr/>
+          </p:nvSpPr>
+          <p:spPr>
+            <a:xfrm>
+              <a:off x="5120356" y="5301208"/>
+              <a:ext cx="675780" cy="369332"/>
+            </a:xfrm>
+            <a:prstGeom prst="rect">
+              <a:avLst/>
+            </a:prstGeom>
+            <a:noFill/>
+          </p:spPr>
+          <p:txBody>
+            <a:bodyPr wrap="square" rtlCol="0">
+              <a:spAutoFit/>
+            </a:bodyPr>
+            <a:lstStyle/>
+            <a:p>
+              <a:r>
+                <a:rPr lang="en-US" dirty="0" smtClean="0">
+                  <a:solidFill>
+                    <a:schemeClr val="bg1">
+                      <a:lumMod val="65000"/>
+                    </a:schemeClr>
+                  </a:solidFill>
+                </a:rPr>
+                <a:t>Now</a:t>
+              </a:r>
+              <a:endParaRPr lang="en-SG" dirty="0">
+                <a:solidFill>
+                  <a:schemeClr val="bg1">
+                    <a:lumMod val="65000"/>
+                  </a:schemeClr>
+                </a:solidFill>
+              </a:endParaRPr>
+            </a:p>
+          </p:txBody>
+        </p:sp>
+      </p:grpSp>
     </p:spTree>
     <p:extLst>
       <p:ext uri="{BB962C8B-B14F-4D97-AF65-F5344CB8AC3E}">
@@ -17713,6 +19027,7 @@
               <a:rPr lang="en-SG"/>
               <a:t>Project Progress Report</a:t>
             </a:r>
+            <a:endParaRPr lang="en-SG"/>
           </a:p>
         </p:txBody>
       </p:sp>
@@ -17961,6 +19276,268 @@
           </a:p>
         </p:txBody>
       </p:sp>
+      <p:grpSp>
+        <p:nvGrpSpPr>
+          <p:cNvPr id="29" name="Unnamed Shape 20150713135318707214"/>
+          <p:cNvGrpSpPr/>
+          <p:nvPr/>
+        </p:nvGrpSpPr>
+        <p:grpSpPr>
+          <a:xfrm>
+            <a:off x="827584" y="5291916"/>
+            <a:ext cx="7488832" cy="657364"/>
+            <a:chOff x="827584" y="5291916"/>
+            <a:chExt cx="7488832" cy="657364"/>
+          </a:xfrm>
+        </p:grpSpPr>
+        <p:sp>
+          <p:nvSpPr>
+            <p:cNvPr id="30" name="Rectangle 29"/>
+            <p:cNvSpPr/>
+            <p:nvPr/>
+          </p:nvSpPr>
+          <p:spPr>
+            <a:xfrm>
+              <a:off x="5436096" y="5661248"/>
+              <a:ext cx="2376264" cy="288032"/>
+            </a:xfrm>
+            <a:prstGeom prst="rect">
+              <a:avLst/>
+            </a:prstGeom>
+            <a:noFill/>
+            <a:ln>
+              <a:solidFill>
+                <a:schemeClr val="bg1">
+                  <a:lumMod val="65000"/>
+                </a:schemeClr>
+              </a:solidFill>
+            </a:ln>
+          </p:spPr>
+          <p:style>
+            <a:lnRef idx="2">
+              <a:schemeClr val="accent1">
+                <a:shade val="50000"/>
+              </a:schemeClr>
+            </a:lnRef>
+            <a:fillRef idx="1">
+              <a:schemeClr val="accent1"/>
+            </a:fillRef>
+            <a:effectRef idx="0">
+              <a:schemeClr val="accent1"/>
+            </a:effectRef>
+            <a:fontRef idx="minor">
+              <a:schemeClr val="lt1"/>
+            </a:fontRef>
+          </p:style>
+          <p:txBody>
+            <a:bodyPr rtlCol="0" anchor="ctr"/>
+            <a:lstStyle/>
+            <a:p>
+              <a:pPr algn="ctr"/>
+              <a:r>
+                <a:rPr lang="en-US" dirty="0" smtClean="0">
+                  <a:solidFill>
+                    <a:schemeClr val="bg1">
+                      <a:lumMod val="65000"/>
+                    </a:schemeClr>
+                  </a:solidFill>
+                </a:rPr>
+                <a:t>2.5 months</a:t>
+              </a:r>
+              <a:endParaRPr lang="en-SG" dirty="0">
+                <a:solidFill>
+                  <a:schemeClr val="bg1">
+                    <a:lumMod val="65000"/>
+                  </a:schemeClr>
+                </a:solidFill>
+              </a:endParaRPr>
+            </a:p>
+          </p:txBody>
+        </p:sp>
+        <p:sp>
+          <p:nvSpPr>
+            <p:cNvPr id="31" name="TextBox 30"/>
+            <p:cNvSpPr txBox="1"/>
+            <p:nvPr/>
+          </p:nvSpPr>
+          <p:spPr>
+            <a:xfrm>
+              <a:off x="7251436" y="5291916"/>
+              <a:ext cx="1064980" cy="369332"/>
+            </a:xfrm>
+            <a:prstGeom prst="rect">
+              <a:avLst/>
+            </a:prstGeom>
+            <a:noFill/>
+          </p:spPr>
+          <p:txBody>
+            <a:bodyPr wrap="square" rtlCol="0">
+              <a:spAutoFit/>
+            </a:bodyPr>
+            <a:lstStyle/>
+            <a:p>
+              <a:pPr algn="r"/>
+              <a:r>
+                <a:rPr lang="en-US" dirty="0" smtClean="0">
+                  <a:solidFill>
+                    <a:schemeClr val="bg1">
+                      <a:lumMod val="65000"/>
+                    </a:schemeClr>
+                  </a:solidFill>
+                </a:rPr>
+                <a:t>Deadline</a:t>
+              </a:r>
+              <a:endParaRPr lang="en-SG" dirty="0">
+                <a:solidFill>
+                  <a:schemeClr val="bg1">
+                    <a:lumMod val="65000"/>
+                  </a:schemeClr>
+                </a:solidFill>
+              </a:endParaRPr>
+            </a:p>
+          </p:txBody>
+        </p:sp>
+        <p:sp>
+          <p:nvSpPr>
+            <p:cNvPr id="32" name="Pentagon 31"/>
+            <p:cNvSpPr/>
+            <p:nvPr/>
+          </p:nvSpPr>
+          <p:spPr>
+            <a:xfrm>
+              <a:off x="1187624" y="5661248"/>
+              <a:ext cx="4392488" cy="288032"/>
+            </a:xfrm>
+            <a:prstGeom prst="homePlate">
+              <a:avLst/>
+            </a:prstGeom>
+            <a:solidFill>
+              <a:schemeClr val="bg1">
+                <a:lumMod val="65000"/>
+              </a:schemeClr>
+            </a:solidFill>
+            <a:ln>
+              <a:solidFill>
+                <a:schemeClr val="bg1">
+                  <a:lumMod val="65000"/>
+                </a:schemeClr>
+              </a:solidFill>
+            </a:ln>
+          </p:spPr>
+          <p:style>
+            <a:lnRef idx="2">
+              <a:schemeClr val="accent1">
+                <a:shade val="50000"/>
+              </a:schemeClr>
+            </a:lnRef>
+            <a:fillRef idx="1">
+              <a:schemeClr val="accent1"/>
+            </a:fillRef>
+            <a:effectRef idx="0">
+              <a:schemeClr val="accent1"/>
+            </a:effectRef>
+            <a:fontRef idx="minor">
+              <a:schemeClr val="lt1"/>
+            </a:fontRef>
+          </p:style>
+          <p:txBody>
+            <a:bodyPr rtlCol="0" anchor="ctr"/>
+            <a:lstStyle/>
+            <a:p>
+              <a:pPr algn="ctr"/>
+              <a:r>
+                <a:rPr lang="en-US" dirty="0" smtClean="0"/>
+                <a:t>8 months</a:t>
+              </a:r>
+              <a:endParaRPr lang="en-SG" dirty="0"/>
+            </a:p>
+          </p:txBody>
+        </p:sp>
+        <p:sp>
+          <p:nvSpPr>
+            <p:cNvPr id="33" name="TextBox 32"/>
+            <p:cNvSpPr txBox="1"/>
+            <p:nvPr/>
+          </p:nvSpPr>
+          <p:spPr>
+            <a:xfrm>
+              <a:off x="827584" y="5301208"/>
+              <a:ext cx="963812" cy="369332"/>
+            </a:xfrm>
+            <a:prstGeom prst="rect">
+              <a:avLst/>
+            </a:prstGeom>
+            <a:noFill/>
+          </p:spPr>
+          <p:txBody>
+            <a:bodyPr wrap="square" rtlCol="0">
+              <a:spAutoFit/>
+            </a:bodyPr>
+            <a:lstStyle/>
+            <a:p>
+              <a:r>
+                <a:rPr lang="en-US" dirty="0" smtClean="0">
+                  <a:solidFill>
+                    <a:schemeClr val="bg1">
+                      <a:lumMod val="65000"/>
+                    </a:schemeClr>
+                  </a:solidFill>
+                </a:rPr>
+                <a:t>Kickoff</a:t>
+              </a:r>
+              <a:endParaRPr lang="en-SG" dirty="0">
+                <a:solidFill>
+                  <a:schemeClr val="bg1">
+                    <a:lumMod val="65000"/>
+                  </a:schemeClr>
+                </a:solidFill>
+              </a:endParaRPr>
+            </a:p>
+          </p:txBody>
+        </p:sp>
+        <p:sp>
+          <p:nvSpPr>
+            <p:cNvPr id="34" name="TextBox 33"/>
+            <p:cNvSpPr txBox="1"/>
+            <p:nvPr/>
+          </p:nvSpPr>
+          <p:spPr>
+            <a:xfrm>
+              <a:off x="5120356" y="5301208"/>
+              <a:ext cx="675780" cy="369332"/>
+            </a:xfrm>
+            <a:prstGeom prst="rect">
+              <a:avLst/>
+            </a:prstGeom>
+            <a:noFill/>
+          </p:spPr>
+          <p:txBody>
+            <a:bodyPr wrap="square" rtlCol="0">
+              <a:spAutoFit/>
+            </a:bodyPr>
+            <a:lstStyle/>
+            <a:p>
+              <a:r>
+                <a:rPr lang="en-US" dirty="0" smtClean="0">
+                  <a:solidFill>
+                    <a:schemeClr val="bg1">
+                      <a:lumMod val="65000"/>
+                    </a:schemeClr>
+                  </a:solidFill>
+                </a:rPr>
+                <a:t>Now</a:t>
+              </a:r>
+              <a:endParaRPr lang="en-SG" dirty="0">
+                <a:solidFill>
+                  <a:schemeClr val="bg1">
+                    <a:lumMod val="65000"/>
+                  </a:schemeClr>
+                </a:solidFill>
+              </a:endParaRPr>
+            </a:p>
+          </p:txBody>
+        </p:sp>
+      </p:grpSp>
     </p:spTree>
     <p:extLst>
       <p:ext uri="{BB962C8B-B14F-4D97-AF65-F5344CB8AC3E}">
@@ -18227,6 +19804,7 @@
               <a:rPr lang="en-SG"/>
               <a:t>Project Progress Report</a:t>
             </a:r>
+            <a:endParaRPr lang="en-SG"/>
           </a:p>
         </p:txBody>
       </p:sp>
@@ -18469,6 +20047,268 @@
           </a:p>
         </p:txBody>
       </p:sp>
+      <p:grpSp>
+        <p:nvGrpSpPr>
+          <p:cNvPr id="29" name="Unnamed Shape 20150713135318707214"/>
+          <p:cNvGrpSpPr/>
+          <p:nvPr/>
+        </p:nvGrpSpPr>
+        <p:grpSpPr>
+          <a:xfrm>
+            <a:off x="827584" y="5291916"/>
+            <a:ext cx="7488832" cy="657364"/>
+            <a:chOff x="827584" y="5291916"/>
+            <a:chExt cx="7488832" cy="657364"/>
+          </a:xfrm>
+        </p:grpSpPr>
+        <p:sp>
+          <p:nvSpPr>
+            <p:cNvPr id="30" name="Rectangle 29"/>
+            <p:cNvSpPr/>
+            <p:nvPr/>
+          </p:nvSpPr>
+          <p:spPr>
+            <a:xfrm>
+              <a:off x="5436096" y="5661248"/>
+              <a:ext cx="2376264" cy="288032"/>
+            </a:xfrm>
+            <a:prstGeom prst="rect">
+              <a:avLst/>
+            </a:prstGeom>
+            <a:noFill/>
+            <a:ln>
+              <a:solidFill>
+                <a:schemeClr val="bg1">
+                  <a:lumMod val="65000"/>
+                </a:schemeClr>
+              </a:solidFill>
+            </a:ln>
+          </p:spPr>
+          <p:style>
+            <a:lnRef idx="2">
+              <a:schemeClr val="accent1">
+                <a:shade val="50000"/>
+              </a:schemeClr>
+            </a:lnRef>
+            <a:fillRef idx="1">
+              <a:schemeClr val="accent1"/>
+            </a:fillRef>
+            <a:effectRef idx="0">
+              <a:schemeClr val="accent1"/>
+            </a:effectRef>
+            <a:fontRef idx="minor">
+              <a:schemeClr val="lt1"/>
+            </a:fontRef>
+          </p:style>
+          <p:txBody>
+            <a:bodyPr rtlCol="0" anchor="ctr"/>
+            <a:lstStyle/>
+            <a:p>
+              <a:pPr algn="ctr"/>
+              <a:r>
+                <a:rPr lang="en-US" dirty="0" smtClean="0">
+                  <a:solidFill>
+                    <a:schemeClr val="bg1">
+                      <a:lumMod val="65000"/>
+                    </a:schemeClr>
+                  </a:solidFill>
+                </a:rPr>
+                <a:t>2.5 months</a:t>
+              </a:r>
+              <a:endParaRPr lang="en-SG" dirty="0">
+                <a:solidFill>
+                  <a:schemeClr val="bg1">
+                    <a:lumMod val="65000"/>
+                  </a:schemeClr>
+                </a:solidFill>
+              </a:endParaRPr>
+            </a:p>
+          </p:txBody>
+        </p:sp>
+        <p:sp>
+          <p:nvSpPr>
+            <p:cNvPr id="31" name="TextBox 30"/>
+            <p:cNvSpPr txBox="1"/>
+            <p:nvPr/>
+          </p:nvSpPr>
+          <p:spPr>
+            <a:xfrm>
+              <a:off x="7251436" y="5291916"/>
+              <a:ext cx="1064980" cy="369332"/>
+            </a:xfrm>
+            <a:prstGeom prst="rect">
+              <a:avLst/>
+            </a:prstGeom>
+            <a:noFill/>
+          </p:spPr>
+          <p:txBody>
+            <a:bodyPr wrap="square" rtlCol="0">
+              <a:spAutoFit/>
+            </a:bodyPr>
+            <a:lstStyle/>
+            <a:p>
+              <a:pPr algn="r"/>
+              <a:r>
+                <a:rPr lang="en-US" dirty="0" smtClean="0">
+                  <a:solidFill>
+                    <a:schemeClr val="bg1">
+                      <a:lumMod val="65000"/>
+                    </a:schemeClr>
+                  </a:solidFill>
+                </a:rPr>
+                <a:t>Deadline</a:t>
+              </a:r>
+              <a:endParaRPr lang="en-SG" dirty="0">
+                <a:solidFill>
+                  <a:schemeClr val="bg1">
+                    <a:lumMod val="65000"/>
+                  </a:schemeClr>
+                </a:solidFill>
+              </a:endParaRPr>
+            </a:p>
+          </p:txBody>
+        </p:sp>
+        <p:sp>
+          <p:nvSpPr>
+            <p:cNvPr id="32" name="Pentagon 31"/>
+            <p:cNvSpPr/>
+            <p:nvPr/>
+          </p:nvSpPr>
+          <p:spPr>
+            <a:xfrm>
+              <a:off x="1187624" y="5661248"/>
+              <a:ext cx="4392488" cy="288032"/>
+            </a:xfrm>
+            <a:prstGeom prst="homePlate">
+              <a:avLst/>
+            </a:prstGeom>
+            <a:solidFill>
+              <a:schemeClr val="bg1">
+                <a:lumMod val="65000"/>
+              </a:schemeClr>
+            </a:solidFill>
+            <a:ln>
+              <a:solidFill>
+                <a:schemeClr val="bg1">
+                  <a:lumMod val="65000"/>
+                </a:schemeClr>
+              </a:solidFill>
+            </a:ln>
+          </p:spPr>
+          <p:style>
+            <a:lnRef idx="2">
+              <a:schemeClr val="accent1">
+                <a:shade val="50000"/>
+              </a:schemeClr>
+            </a:lnRef>
+            <a:fillRef idx="1">
+              <a:schemeClr val="accent1"/>
+            </a:fillRef>
+            <a:effectRef idx="0">
+              <a:schemeClr val="accent1"/>
+            </a:effectRef>
+            <a:fontRef idx="minor">
+              <a:schemeClr val="lt1"/>
+            </a:fontRef>
+          </p:style>
+          <p:txBody>
+            <a:bodyPr rtlCol="0" anchor="ctr"/>
+            <a:lstStyle/>
+            <a:p>
+              <a:pPr algn="ctr"/>
+              <a:r>
+                <a:rPr lang="en-US" dirty="0" smtClean="0"/>
+                <a:t>8 months</a:t>
+              </a:r>
+              <a:endParaRPr lang="en-SG" dirty="0"/>
+            </a:p>
+          </p:txBody>
+        </p:sp>
+        <p:sp>
+          <p:nvSpPr>
+            <p:cNvPr id="33" name="TextBox 32"/>
+            <p:cNvSpPr txBox="1"/>
+            <p:nvPr/>
+          </p:nvSpPr>
+          <p:spPr>
+            <a:xfrm>
+              <a:off x="827584" y="5301208"/>
+              <a:ext cx="963812" cy="369332"/>
+            </a:xfrm>
+            <a:prstGeom prst="rect">
+              <a:avLst/>
+            </a:prstGeom>
+            <a:noFill/>
+          </p:spPr>
+          <p:txBody>
+            <a:bodyPr wrap="square" rtlCol="0">
+              <a:spAutoFit/>
+            </a:bodyPr>
+            <a:lstStyle/>
+            <a:p>
+              <a:r>
+                <a:rPr lang="en-US" dirty="0" smtClean="0">
+                  <a:solidFill>
+                    <a:schemeClr val="bg1">
+                      <a:lumMod val="65000"/>
+                    </a:schemeClr>
+                  </a:solidFill>
+                </a:rPr>
+                <a:t>Kickoff</a:t>
+              </a:r>
+              <a:endParaRPr lang="en-SG" dirty="0">
+                <a:solidFill>
+                  <a:schemeClr val="bg1">
+                    <a:lumMod val="65000"/>
+                  </a:schemeClr>
+                </a:solidFill>
+              </a:endParaRPr>
+            </a:p>
+          </p:txBody>
+        </p:sp>
+        <p:sp>
+          <p:nvSpPr>
+            <p:cNvPr id="34" name="TextBox 33"/>
+            <p:cNvSpPr txBox="1"/>
+            <p:nvPr/>
+          </p:nvSpPr>
+          <p:spPr>
+            <a:xfrm>
+              <a:off x="5120356" y="5301208"/>
+              <a:ext cx="675780" cy="369332"/>
+            </a:xfrm>
+            <a:prstGeom prst="rect">
+              <a:avLst/>
+            </a:prstGeom>
+            <a:noFill/>
+          </p:spPr>
+          <p:txBody>
+            <a:bodyPr wrap="square" rtlCol="0">
+              <a:spAutoFit/>
+            </a:bodyPr>
+            <a:lstStyle/>
+            <a:p>
+              <a:r>
+                <a:rPr lang="en-US" dirty="0" smtClean="0">
+                  <a:solidFill>
+                    <a:schemeClr val="bg1">
+                      <a:lumMod val="65000"/>
+                    </a:schemeClr>
+                  </a:solidFill>
+                </a:rPr>
+                <a:t>Now</a:t>
+              </a:r>
+              <a:endParaRPr lang="en-SG" dirty="0">
+                <a:solidFill>
+                  <a:schemeClr val="bg1">
+                    <a:lumMod val="65000"/>
+                  </a:schemeClr>
+                </a:solidFill>
+              </a:endParaRPr>
+            </a:p>
+          </p:txBody>
+        </p:sp>
+      </p:grpSp>
     </p:spTree>
     <p:extLst>
       <p:ext uri="{BB962C8B-B14F-4D97-AF65-F5344CB8AC3E}">
@@ -19227,6 +21067,7 @@
               <a:rPr lang="en-SG"/>
               <a:t>Project Progress Report</a:t>
             </a:r>
+            <a:endParaRPr lang="en-SG"/>
           </a:p>
         </p:txBody>
       </p:sp>
@@ -19469,6 +21310,268 @@
           </a:p>
         </p:txBody>
       </p:sp>
+      <p:grpSp>
+        <p:nvGrpSpPr>
+          <p:cNvPr id="29" name="Unnamed Shape 20150713135318707214"/>
+          <p:cNvGrpSpPr/>
+          <p:nvPr/>
+        </p:nvGrpSpPr>
+        <p:grpSpPr>
+          <a:xfrm>
+            <a:off x="827584" y="5291916"/>
+            <a:ext cx="7488832" cy="657364"/>
+            <a:chOff x="827584" y="5291916"/>
+            <a:chExt cx="7488832" cy="657364"/>
+          </a:xfrm>
+        </p:grpSpPr>
+        <p:sp>
+          <p:nvSpPr>
+            <p:cNvPr id="30" name="Rectangle 29"/>
+            <p:cNvSpPr/>
+            <p:nvPr/>
+          </p:nvSpPr>
+          <p:spPr>
+            <a:xfrm>
+              <a:off x="5436096" y="5661248"/>
+              <a:ext cx="2376264" cy="288032"/>
+            </a:xfrm>
+            <a:prstGeom prst="rect">
+              <a:avLst/>
+            </a:prstGeom>
+            <a:noFill/>
+            <a:ln>
+              <a:solidFill>
+                <a:schemeClr val="bg1">
+                  <a:lumMod val="65000"/>
+                </a:schemeClr>
+              </a:solidFill>
+            </a:ln>
+          </p:spPr>
+          <p:style>
+            <a:lnRef idx="2">
+              <a:schemeClr val="accent1">
+                <a:shade val="50000"/>
+              </a:schemeClr>
+            </a:lnRef>
+            <a:fillRef idx="1">
+              <a:schemeClr val="accent1"/>
+            </a:fillRef>
+            <a:effectRef idx="0">
+              <a:schemeClr val="accent1"/>
+            </a:effectRef>
+            <a:fontRef idx="minor">
+              <a:schemeClr val="lt1"/>
+            </a:fontRef>
+          </p:style>
+          <p:txBody>
+            <a:bodyPr rtlCol="0" anchor="ctr"/>
+            <a:lstStyle/>
+            <a:p>
+              <a:pPr algn="ctr"/>
+              <a:r>
+                <a:rPr lang="en-US" dirty="0" smtClean="0">
+                  <a:solidFill>
+                    <a:schemeClr val="bg1">
+                      <a:lumMod val="65000"/>
+                    </a:schemeClr>
+                  </a:solidFill>
+                </a:rPr>
+                <a:t>2.5 months</a:t>
+              </a:r>
+              <a:endParaRPr lang="en-SG" dirty="0">
+                <a:solidFill>
+                  <a:schemeClr val="bg1">
+                    <a:lumMod val="65000"/>
+                  </a:schemeClr>
+                </a:solidFill>
+              </a:endParaRPr>
+            </a:p>
+          </p:txBody>
+        </p:sp>
+        <p:sp>
+          <p:nvSpPr>
+            <p:cNvPr id="31" name="TextBox 30"/>
+            <p:cNvSpPr txBox="1"/>
+            <p:nvPr/>
+          </p:nvSpPr>
+          <p:spPr>
+            <a:xfrm>
+              <a:off x="7251436" y="5291916"/>
+              <a:ext cx="1064980" cy="369332"/>
+            </a:xfrm>
+            <a:prstGeom prst="rect">
+              <a:avLst/>
+            </a:prstGeom>
+            <a:noFill/>
+          </p:spPr>
+          <p:txBody>
+            <a:bodyPr wrap="square" rtlCol="0">
+              <a:spAutoFit/>
+            </a:bodyPr>
+            <a:lstStyle/>
+            <a:p>
+              <a:pPr algn="r"/>
+              <a:r>
+                <a:rPr lang="en-US" dirty="0" smtClean="0">
+                  <a:solidFill>
+                    <a:schemeClr val="bg1">
+                      <a:lumMod val="65000"/>
+                    </a:schemeClr>
+                  </a:solidFill>
+                </a:rPr>
+                <a:t>Deadline</a:t>
+              </a:r>
+              <a:endParaRPr lang="en-SG" dirty="0">
+                <a:solidFill>
+                  <a:schemeClr val="bg1">
+                    <a:lumMod val="65000"/>
+                  </a:schemeClr>
+                </a:solidFill>
+              </a:endParaRPr>
+            </a:p>
+          </p:txBody>
+        </p:sp>
+        <p:sp>
+          <p:nvSpPr>
+            <p:cNvPr id="32" name="Pentagon 31"/>
+            <p:cNvSpPr/>
+            <p:nvPr/>
+          </p:nvSpPr>
+          <p:spPr>
+            <a:xfrm>
+              <a:off x="1187624" y="5661248"/>
+              <a:ext cx="4392488" cy="288032"/>
+            </a:xfrm>
+            <a:prstGeom prst="homePlate">
+              <a:avLst/>
+            </a:prstGeom>
+            <a:solidFill>
+              <a:schemeClr val="bg1">
+                <a:lumMod val="65000"/>
+              </a:schemeClr>
+            </a:solidFill>
+            <a:ln>
+              <a:solidFill>
+                <a:schemeClr val="bg1">
+                  <a:lumMod val="65000"/>
+                </a:schemeClr>
+              </a:solidFill>
+            </a:ln>
+          </p:spPr>
+          <p:style>
+            <a:lnRef idx="2">
+              <a:schemeClr val="accent1">
+                <a:shade val="50000"/>
+              </a:schemeClr>
+            </a:lnRef>
+            <a:fillRef idx="1">
+              <a:schemeClr val="accent1"/>
+            </a:fillRef>
+            <a:effectRef idx="0">
+              <a:schemeClr val="accent1"/>
+            </a:effectRef>
+            <a:fontRef idx="minor">
+              <a:schemeClr val="lt1"/>
+            </a:fontRef>
+          </p:style>
+          <p:txBody>
+            <a:bodyPr rtlCol="0" anchor="ctr"/>
+            <a:lstStyle/>
+            <a:p>
+              <a:pPr algn="ctr"/>
+              <a:r>
+                <a:rPr lang="en-US" dirty="0" smtClean="0"/>
+                <a:t>8 months</a:t>
+              </a:r>
+              <a:endParaRPr lang="en-SG" dirty="0"/>
+            </a:p>
+          </p:txBody>
+        </p:sp>
+        <p:sp>
+          <p:nvSpPr>
+            <p:cNvPr id="33" name="TextBox 32"/>
+            <p:cNvSpPr txBox="1"/>
+            <p:nvPr/>
+          </p:nvSpPr>
+          <p:spPr>
+            <a:xfrm>
+              <a:off x="827584" y="5301208"/>
+              <a:ext cx="963812" cy="369332"/>
+            </a:xfrm>
+            <a:prstGeom prst="rect">
+              <a:avLst/>
+            </a:prstGeom>
+            <a:noFill/>
+          </p:spPr>
+          <p:txBody>
+            <a:bodyPr wrap="square" rtlCol="0">
+              <a:spAutoFit/>
+            </a:bodyPr>
+            <a:lstStyle/>
+            <a:p>
+              <a:r>
+                <a:rPr lang="en-US" dirty="0" smtClean="0">
+                  <a:solidFill>
+                    <a:schemeClr val="bg1">
+                      <a:lumMod val="65000"/>
+                    </a:schemeClr>
+                  </a:solidFill>
+                </a:rPr>
+                <a:t>Kickoff</a:t>
+              </a:r>
+              <a:endParaRPr lang="en-SG" dirty="0">
+                <a:solidFill>
+                  <a:schemeClr val="bg1">
+                    <a:lumMod val="65000"/>
+                  </a:schemeClr>
+                </a:solidFill>
+              </a:endParaRPr>
+            </a:p>
+          </p:txBody>
+        </p:sp>
+        <p:sp>
+          <p:nvSpPr>
+            <p:cNvPr id="34" name="TextBox 33"/>
+            <p:cNvSpPr txBox="1"/>
+            <p:nvPr/>
+          </p:nvSpPr>
+          <p:spPr>
+            <a:xfrm>
+              <a:off x="5120356" y="5301208"/>
+              <a:ext cx="675780" cy="369332"/>
+            </a:xfrm>
+            <a:prstGeom prst="rect">
+              <a:avLst/>
+            </a:prstGeom>
+            <a:noFill/>
+          </p:spPr>
+          <p:txBody>
+            <a:bodyPr wrap="square" rtlCol="0">
+              <a:spAutoFit/>
+            </a:bodyPr>
+            <a:lstStyle/>
+            <a:p>
+              <a:r>
+                <a:rPr lang="en-US" dirty="0" smtClean="0">
+                  <a:solidFill>
+                    <a:schemeClr val="bg1">
+                      <a:lumMod val="65000"/>
+                    </a:schemeClr>
+                  </a:solidFill>
+                </a:rPr>
+                <a:t>Now</a:t>
+              </a:r>
+              <a:endParaRPr lang="en-SG" dirty="0">
+                <a:solidFill>
+                  <a:schemeClr val="bg1">
+                    <a:lumMod val="65000"/>
+                  </a:schemeClr>
+                </a:solidFill>
+              </a:endParaRPr>
+            </a:p>
+          </p:txBody>
+        </p:sp>
+      </p:grpSp>
     </p:spTree>
     <p:extLst>
       <p:ext uri="{BB962C8B-B14F-4D97-AF65-F5344CB8AC3E}">
@@ -19735,6 +21838,7 @@
               <a:rPr lang="en-SG"/>
               <a:t>Project Progress Report</a:t>
             </a:r>
+            <a:endParaRPr lang="en-SG"/>
           </a:p>
         </p:txBody>
       </p:sp>
@@ -19971,6 +22075,268 @@
           </a:p>
         </p:txBody>
       </p:sp>
+      <p:grpSp>
+        <p:nvGrpSpPr>
+          <p:cNvPr id="29" name="Unnamed Shape 20150713135318707214"/>
+          <p:cNvGrpSpPr/>
+          <p:nvPr/>
+        </p:nvGrpSpPr>
+        <p:grpSpPr>
+          <a:xfrm>
+            <a:off x="827584" y="5291916"/>
+            <a:ext cx="7488832" cy="657364"/>
+            <a:chOff x="827584" y="5291916"/>
+            <a:chExt cx="7488832" cy="657364"/>
+          </a:xfrm>
+        </p:grpSpPr>
+        <p:sp>
+          <p:nvSpPr>
+            <p:cNvPr id="30" name="Rectangle 29"/>
+            <p:cNvSpPr/>
+            <p:nvPr/>
+          </p:nvSpPr>
+          <p:spPr>
+            <a:xfrm>
+              <a:off x="5436096" y="5661248"/>
+              <a:ext cx="2376264" cy="288032"/>
+            </a:xfrm>
+            <a:prstGeom prst="rect">
+              <a:avLst/>
+            </a:prstGeom>
+            <a:noFill/>
+            <a:ln>
+              <a:solidFill>
+                <a:schemeClr val="bg1">
+                  <a:lumMod val="65000"/>
+                </a:schemeClr>
+              </a:solidFill>
+            </a:ln>
+          </p:spPr>
+          <p:style>
+            <a:lnRef idx="2">
+              <a:schemeClr val="accent1">
+                <a:shade val="50000"/>
+              </a:schemeClr>
+            </a:lnRef>
+            <a:fillRef idx="1">
+              <a:schemeClr val="accent1"/>
+            </a:fillRef>
+            <a:effectRef idx="0">
+              <a:schemeClr val="accent1"/>
+            </a:effectRef>
+            <a:fontRef idx="minor">
+              <a:schemeClr val="lt1"/>
+            </a:fontRef>
+          </p:style>
+          <p:txBody>
+            <a:bodyPr rtlCol="0" anchor="ctr"/>
+            <a:lstStyle/>
+            <a:p>
+              <a:pPr algn="ctr"/>
+              <a:r>
+                <a:rPr lang="en-US" dirty="0" smtClean="0">
+                  <a:solidFill>
+                    <a:schemeClr val="bg1">
+                      <a:lumMod val="65000"/>
+                    </a:schemeClr>
+                  </a:solidFill>
+                </a:rPr>
+                <a:t>2.5 months</a:t>
+              </a:r>
+              <a:endParaRPr lang="en-SG" dirty="0">
+                <a:solidFill>
+                  <a:schemeClr val="bg1">
+                    <a:lumMod val="65000"/>
+                  </a:schemeClr>
+                </a:solidFill>
+              </a:endParaRPr>
+            </a:p>
+          </p:txBody>
+        </p:sp>
+        <p:sp>
+          <p:nvSpPr>
+            <p:cNvPr id="31" name="TextBox 30"/>
+            <p:cNvSpPr txBox="1"/>
+            <p:nvPr/>
+          </p:nvSpPr>
+          <p:spPr>
+            <a:xfrm>
+              <a:off x="7251436" y="5291916"/>
+              <a:ext cx="1064980" cy="369332"/>
+            </a:xfrm>
+            <a:prstGeom prst="rect">
+              <a:avLst/>
+            </a:prstGeom>
+            <a:noFill/>
+          </p:spPr>
+          <p:txBody>
+            <a:bodyPr wrap="square" rtlCol="0">
+              <a:spAutoFit/>
+            </a:bodyPr>
+            <a:lstStyle/>
+            <a:p>
+              <a:pPr algn="r"/>
+              <a:r>
+                <a:rPr lang="en-US" dirty="0" smtClean="0">
+                  <a:solidFill>
+                    <a:schemeClr val="bg1">
+                      <a:lumMod val="65000"/>
+                    </a:schemeClr>
+                  </a:solidFill>
+                </a:rPr>
+                <a:t>Deadline</a:t>
+              </a:r>
+              <a:endParaRPr lang="en-SG" dirty="0">
+                <a:solidFill>
+                  <a:schemeClr val="bg1">
+                    <a:lumMod val="65000"/>
+                  </a:schemeClr>
+                </a:solidFill>
+              </a:endParaRPr>
+            </a:p>
+          </p:txBody>
+        </p:sp>
+        <p:sp>
+          <p:nvSpPr>
+            <p:cNvPr id="32" name="Pentagon 31"/>
+            <p:cNvSpPr/>
+            <p:nvPr/>
+          </p:nvSpPr>
+          <p:spPr>
+            <a:xfrm>
+              <a:off x="1187624" y="5661248"/>
+              <a:ext cx="4392488" cy="288032"/>
+            </a:xfrm>
+            <a:prstGeom prst="homePlate">
+              <a:avLst/>
+            </a:prstGeom>
+            <a:solidFill>
+              <a:schemeClr val="bg1">
+                <a:lumMod val="65000"/>
+              </a:schemeClr>
+            </a:solidFill>
+            <a:ln>
+              <a:solidFill>
+                <a:schemeClr val="bg1">
+                  <a:lumMod val="65000"/>
+                </a:schemeClr>
+              </a:solidFill>
+            </a:ln>
+          </p:spPr>
+          <p:style>
+            <a:lnRef idx="2">
+              <a:schemeClr val="accent1">
+                <a:shade val="50000"/>
+              </a:schemeClr>
+            </a:lnRef>
+            <a:fillRef idx="1">
+              <a:schemeClr val="accent1"/>
+            </a:fillRef>
+            <a:effectRef idx="0">
+              <a:schemeClr val="accent1"/>
+            </a:effectRef>
+            <a:fontRef idx="minor">
+              <a:schemeClr val="lt1"/>
+            </a:fontRef>
+          </p:style>
+          <p:txBody>
+            <a:bodyPr rtlCol="0" anchor="ctr"/>
+            <a:lstStyle/>
+            <a:p>
+              <a:pPr algn="ctr"/>
+              <a:r>
+                <a:rPr lang="en-US" dirty="0" smtClean="0"/>
+                <a:t>8 months</a:t>
+              </a:r>
+              <a:endParaRPr lang="en-SG" dirty="0"/>
+            </a:p>
+          </p:txBody>
+        </p:sp>
+        <p:sp>
+          <p:nvSpPr>
+            <p:cNvPr id="33" name="TextBox 32"/>
+            <p:cNvSpPr txBox="1"/>
+            <p:nvPr/>
+          </p:nvSpPr>
+          <p:spPr>
+            <a:xfrm>
+              <a:off x="827584" y="5301208"/>
+              <a:ext cx="963812" cy="369332"/>
+            </a:xfrm>
+            <a:prstGeom prst="rect">
+              <a:avLst/>
+            </a:prstGeom>
+            <a:noFill/>
+          </p:spPr>
+          <p:txBody>
+            <a:bodyPr wrap="square" rtlCol="0">
+              <a:spAutoFit/>
+            </a:bodyPr>
+            <a:lstStyle/>
+            <a:p>
+              <a:r>
+                <a:rPr lang="en-US" dirty="0" smtClean="0">
+                  <a:solidFill>
+                    <a:schemeClr val="bg1">
+                      <a:lumMod val="65000"/>
+                    </a:schemeClr>
+                  </a:solidFill>
+                </a:rPr>
+                <a:t>Kickoff</a:t>
+              </a:r>
+              <a:endParaRPr lang="en-SG" dirty="0">
+                <a:solidFill>
+                  <a:schemeClr val="bg1">
+                    <a:lumMod val="65000"/>
+                  </a:schemeClr>
+                </a:solidFill>
+              </a:endParaRPr>
+            </a:p>
+          </p:txBody>
+        </p:sp>
+        <p:sp>
+          <p:nvSpPr>
+            <p:cNvPr id="34" name="TextBox 33"/>
+            <p:cNvSpPr txBox="1"/>
+            <p:nvPr/>
+          </p:nvSpPr>
+          <p:spPr>
+            <a:xfrm>
+              <a:off x="5120356" y="5301208"/>
+              <a:ext cx="675780" cy="369332"/>
+            </a:xfrm>
+            <a:prstGeom prst="rect">
+              <a:avLst/>
+            </a:prstGeom>
+            <a:noFill/>
+          </p:spPr>
+          <p:txBody>
+            <a:bodyPr wrap="square" rtlCol="0">
+              <a:spAutoFit/>
+            </a:bodyPr>
+            <a:lstStyle/>
+            <a:p>
+              <a:r>
+                <a:rPr lang="en-US" dirty="0" smtClean="0">
+                  <a:solidFill>
+                    <a:schemeClr val="bg1">
+                      <a:lumMod val="65000"/>
+                    </a:schemeClr>
+                  </a:solidFill>
+                </a:rPr>
+                <a:t>Now</a:t>
+              </a:r>
+              <a:endParaRPr lang="en-SG" dirty="0">
+                <a:solidFill>
+                  <a:schemeClr val="bg1">
+                    <a:lumMod val="65000"/>
+                  </a:schemeClr>
+                </a:solidFill>
+              </a:endParaRPr>
+            </a:p>
+          </p:txBody>
+        </p:sp>
+      </p:grpSp>
     </p:spTree>
     <p:extLst>
       <p:ext uri="{BB962C8B-B14F-4D97-AF65-F5344CB8AC3E}">
@@ -20246,6 +22612,7 @@
               <a:rPr lang="en-SG"/>
               <a:t>Project Progress Report</a:t>
             </a:r>
+            <a:endParaRPr lang="en-SG"/>
           </a:p>
         </p:txBody>
       </p:sp>
@@ -20510,6 +22877,268 @@
           </a:p>
         </p:txBody>
       </p:sp>
+      <p:grpSp>
+        <p:nvGrpSpPr>
+          <p:cNvPr id="31" name="Unnamed Shape 20150713135318707214"/>
+          <p:cNvGrpSpPr/>
+          <p:nvPr/>
+        </p:nvGrpSpPr>
+        <p:grpSpPr>
+          <a:xfrm>
+            <a:off x="827584" y="5291916"/>
+            <a:ext cx="7488832" cy="657364"/>
+            <a:chOff x="827584" y="5291916"/>
+            <a:chExt cx="7488832" cy="657364"/>
+          </a:xfrm>
+        </p:grpSpPr>
+        <p:sp>
+          <p:nvSpPr>
+            <p:cNvPr id="32" name="Rectangle 31"/>
+            <p:cNvSpPr/>
+            <p:nvPr/>
+          </p:nvSpPr>
+          <p:spPr>
+            <a:xfrm>
+              <a:off x="5436096" y="5661248"/>
+              <a:ext cx="2376264" cy="288032"/>
+            </a:xfrm>
+            <a:prstGeom prst="rect">
+              <a:avLst/>
+            </a:prstGeom>
+            <a:noFill/>
+            <a:ln>
+              <a:solidFill>
+                <a:schemeClr val="bg1">
+                  <a:lumMod val="65000"/>
+                </a:schemeClr>
+              </a:solidFill>
+            </a:ln>
+          </p:spPr>
+          <p:style>
+            <a:lnRef idx="2">
+              <a:schemeClr val="accent1">
+                <a:shade val="50000"/>
+              </a:schemeClr>
+            </a:lnRef>
+            <a:fillRef idx="1">
+              <a:schemeClr val="accent1"/>
+            </a:fillRef>
+            <a:effectRef idx="0">
+              <a:schemeClr val="accent1"/>
+            </a:effectRef>
+            <a:fontRef idx="minor">
+              <a:schemeClr val="lt1"/>
+            </a:fontRef>
+          </p:style>
+          <p:txBody>
+            <a:bodyPr rtlCol="0" anchor="ctr"/>
+            <a:lstStyle/>
+            <a:p>
+              <a:pPr algn="ctr"/>
+              <a:r>
+                <a:rPr lang="en-US" dirty="0" smtClean="0">
+                  <a:solidFill>
+                    <a:schemeClr val="bg1">
+                      <a:lumMod val="65000"/>
+                    </a:schemeClr>
+                  </a:solidFill>
+                </a:rPr>
+                <a:t>2.5 months</a:t>
+              </a:r>
+              <a:endParaRPr lang="en-SG" dirty="0">
+                <a:solidFill>
+                  <a:schemeClr val="bg1">
+                    <a:lumMod val="65000"/>
+                  </a:schemeClr>
+                </a:solidFill>
+              </a:endParaRPr>
+            </a:p>
+          </p:txBody>
+        </p:sp>
+        <p:sp>
+          <p:nvSpPr>
+            <p:cNvPr id="33" name="TextBox 32"/>
+            <p:cNvSpPr txBox="1"/>
+            <p:nvPr/>
+          </p:nvSpPr>
+          <p:spPr>
+            <a:xfrm>
+              <a:off x="7251436" y="5291916"/>
+              <a:ext cx="1064980" cy="369332"/>
+            </a:xfrm>
+            <a:prstGeom prst="rect">
+              <a:avLst/>
+            </a:prstGeom>
+            <a:noFill/>
+          </p:spPr>
+          <p:txBody>
+            <a:bodyPr wrap="square" rtlCol="0">
+              <a:spAutoFit/>
+            </a:bodyPr>
+            <a:lstStyle/>
+            <a:p>
+              <a:pPr algn="r"/>
+              <a:r>
+                <a:rPr lang="en-US" dirty="0" smtClean="0">
+                  <a:solidFill>
+                    <a:schemeClr val="bg1">
+                      <a:lumMod val="65000"/>
+                    </a:schemeClr>
+                  </a:solidFill>
+                </a:rPr>
+                <a:t>Deadline</a:t>
+              </a:r>
+              <a:endParaRPr lang="en-SG" dirty="0">
+                <a:solidFill>
+                  <a:schemeClr val="bg1">
+                    <a:lumMod val="65000"/>
+                  </a:schemeClr>
+                </a:solidFill>
+              </a:endParaRPr>
+            </a:p>
+          </p:txBody>
+        </p:sp>
+        <p:sp>
+          <p:nvSpPr>
+            <p:cNvPr id="34" name="Pentagon 33"/>
+            <p:cNvSpPr/>
+            <p:nvPr/>
+          </p:nvSpPr>
+          <p:spPr>
+            <a:xfrm>
+              <a:off x="1187624" y="5661248"/>
+              <a:ext cx="4392488" cy="288032"/>
+            </a:xfrm>
+            <a:prstGeom prst="homePlate">
+              <a:avLst/>
+            </a:prstGeom>
+            <a:solidFill>
+              <a:schemeClr val="bg1">
+                <a:lumMod val="65000"/>
+              </a:schemeClr>
+            </a:solidFill>
+            <a:ln>
+              <a:solidFill>
+                <a:schemeClr val="bg1">
+                  <a:lumMod val="65000"/>
+                </a:schemeClr>
+              </a:solidFill>
+            </a:ln>
+          </p:spPr>
+          <p:style>
+            <a:lnRef idx="2">
+              <a:schemeClr val="accent1">
+                <a:shade val="50000"/>
+              </a:schemeClr>
+            </a:lnRef>
+            <a:fillRef idx="1">
+              <a:schemeClr val="accent1"/>
+            </a:fillRef>
+            <a:effectRef idx="0">
+              <a:schemeClr val="accent1"/>
+            </a:effectRef>
+            <a:fontRef idx="minor">
+              <a:schemeClr val="lt1"/>
+            </a:fontRef>
+          </p:style>
+          <p:txBody>
+            <a:bodyPr rtlCol="0" anchor="ctr"/>
+            <a:lstStyle/>
+            <a:p>
+              <a:pPr algn="ctr"/>
+              <a:r>
+                <a:rPr lang="en-US" dirty="0" smtClean="0"/>
+                <a:t>8 months</a:t>
+              </a:r>
+              <a:endParaRPr lang="en-SG" dirty="0"/>
+            </a:p>
+          </p:txBody>
+        </p:sp>
+        <p:sp>
+          <p:nvSpPr>
+            <p:cNvPr id="35" name="TextBox 34"/>
+            <p:cNvSpPr txBox="1"/>
+            <p:nvPr/>
+          </p:nvSpPr>
+          <p:spPr>
+            <a:xfrm>
+              <a:off x="827584" y="5301208"/>
+              <a:ext cx="963812" cy="369332"/>
+            </a:xfrm>
+            <a:prstGeom prst="rect">
+              <a:avLst/>
+            </a:prstGeom>
+            <a:noFill/>
+          </p:spPr>
+          <p:txBody>
+            <a:bodyPr wrap="square" rtlCol="0">
+              <a:spAutoFit/>
+            </a:bodyPr>
+            <a:lstStyle/>
+            <a:p>
+              <a:r>
+                <a:rPr lang="en-US" dirty="0" smtClean="0">
+                  <a:solidFill>
+                    <a:schemeClr val="bg1">
+                      <a:lumMod val="65000"/>
+                    </a:schemeClr>
+                  </a:solidFill>
+                </a:rPr>
+                <a:t>Kickoff</a:t>
+              </a:r>
+              <a:endParaRPr lang="en-SG" dirty="0">
+                <a:solidFill>
+                  <a:schemeClr val="bg1">
+                    <a:lumMod val="65000"/>
+                  </a:schemeClr>
+                </a:solidFill>
+              </a:endParaRPr>
+            </a:p>
+          </p:txBody>
+        </p:sp>
+        <p:sp>
+          <p:nvSpPr>
+            <p:cNvPr id="36" name="TextBox 35"/>
+            <p:cNvSpPr txBox="1"/>
+            <p:nvPr/>
+          </p:nvSpPr>
+          <p:spPr>
+            <a:xfrm>
+              <a:off x="5120356" y="5301208"/>
+              <a:ext cx="675780" cy="369332"/>
+            </a:xfrm>
+            <a:prstGeom prst="rect">
+              <a:avLst/>
+            </a:prstGeom>
+            <a:noFill/>
+          </p:spPr>
+          <p:txBody>
+            <a:bodyPr wrap="square" rtlCol="0">
+              <a:spAutoFit/>
+            </a:bodyPr>
+            <a:lstStyle/>
+            <a:p>
+              <a:r>
+                <a:rPr lang="en-US" dirty="0" smtClean="0">
+                  <a:solidFill>
+                    <a:schemeClr val="bg1">
+                      <a:lumMod val="65000"/>
+                    </a:schemeClr>
+                  </a:solidFill>
+                </a:rPr>
+                <a:t>Now</a:t>
+              </a:r>
+              <a:endParaRPr lang="en-SG" dirty="0">
+                <a:solidFill>
+                  <a:schemeClr val="bg1">
+                    <a:lumMod val="65000"/>
+                  </a:schemeClr>
+                </a:solidFill>
+              </a:endParaRPr>
+            </a:p>
+          </p:txBody>
+        </p:sp>
+      </p:grpSp>
     </p:spTree>
     <p:extLst>
       <p:ext uri="{BB962C8B-B14F-4D97-AF65-F5344CB8AC3E}">
@@ -20935,6 +23564,7 @@
               <a:rPr lang="en-SG"/>
               <a:t>Project Progress Report</a:t>
             </a:r>
+            <a:endParaRPr lang="en-SG"/>
           </a:p>
         </p:txBody>
       </p:sp>
@@ -21171,6 +23801,268 @@
           </a:p>
         </p:txBody>
       </p:sp>
+      <p:grpSp>
+        <p:nvGrpSpPr>
+          <p:cNvPr id="29" name="Unnamed Shape 20150713135318707214"/>
+          <p:cNvGrpSpPr/>
+          <p:nvPr/>
+        </p:nvGrpSpPr>
+        <p:grpSpPr>
+          <a:xfrm>
+            <a:off x="827584" y="5291916"/>
+            <a:ext cx="7488832" cy="657364"/>
+            <a:chOff x="827584" y="5291916"/>
+            <a:chExt cx="7488832" cy="657364"/>
+          </a:xfrm>
+        </p:grpSpPr>
+        <p:sp>
+          <p:nvSpPr>
+            <p:cNvPr id="30" name="Rectangle 29"/>
+            <p:cNvSpPr/>
+            <p:nvPr/>
+          </p:nvSpPr>
+          <p:spPr>
+            <a:xfrm>
+              <a:off x="5436096" y="5661248"/>
+              <a:ext cx="2376264" cy="288032"/>
+            </a:xfrm>
+            <a:prstGeom prst="rect">
+              <a:avLst/>
+            </a:prstGeom>
+            <a:noFill/>
+            <a:ln>
+              <a:solidFill>
+                <a:schemeClr val="bg1">
+                  <a:lumMod val="65000"/>
+                </a:schemeClr>
+              </a:solidFill>
+            </a:ln>
+          </p:spPr>
+          <p:style>
+            <a:lnRef idx="2">
+              <a:schemeClr val="accent1">
+                <a:shade val="50000"/>
+              </a:schemeClr>
+            </a:lnRef>
+            <a:fillRef idx="1">
+              <a:schemeClr val="accent1"/>
+            </a:fillRef>
+            <a:effectRef idx="0">
+              <a:schemeClr val="accent1"/>
+            </a:effectRef>
+            <a:fontRef idx="minor">
+              <a:schemeClr val="lt1"/>
+            </a:fontRef>
+          </p:style>
+          <p:txBody>
+            <a:bodyPr rtlCol="0" anchor="ctr"/>
+            <a:lstStyle/>
+            <a:p>
+              <a:pPr algn="ctr"/>
+              <a:r>
+                <a:rPr lang="en-US" dirty="0" smtClean="0">
+                  <a:solidFill>
+                    <a:schemeClr val="bg1">
+                      <a:lumMod val="65000"/>
+                    </a:schemeClr>
+                  </a:solidFill>
+                </a:rPr>
+                <a:t>2.5 months</a:t>
+              </a:r>
+              <a:endParaRPr lang="en-SG" dirty="0">
+                <a:solidFill>
+                  <a:schemeClr val="bg1">
+                    <a:lumMod val="65000"/>
+                  </a:schemeClr>
+                </a:solidFill>
+              </a:endParaRPr>
+            </a:p>
+          </p:txBody>
+        </p:sp>
+        <p:sp>
+          <p:nvSpPr>
+            <p:cNvPr id="31" name="TextBox 30"/>
+            <p:cNvSpPr txBox="1"/>
+            <p:nvPr/>
+          </p:nvSpPr>
+          <p:spPr>
+            <a:xfrm>
+              <a:off x="7251436" y="5291916"/>
+              <a:ext cx="1064980" cy="369332"/>
+            </a:xfrm>
+            <a:prstGeom prst="rect">
+              <a:avLst/>
+            </a:prstGeom>
+            <a:noFill/>
+          </p:spPr>
+          <p:txBody>
+            <a:bodyPr wrap="square" rtlCol="0">
+              <a:spAutoFit/>
+            </a:bodyPr>
+            <a:lstStyle/>
+            <a:p>
+              <a:pPr algn="r"/>
+              <a:r>
+                <a:rPr lang="en-US" dirty="0" smtClean="0">
+                  <a:solidFill>
+                    <a:schemeClr val="bg1">
+                      <a:lumMod val="65000"/>
+                    </a:schemeClr>
+                  </a:solidFill>
+                </a:rPr>
+                <a:t>Deadline</a:t>
+              </a:r>
+              <a:endParaRPr lang="en-SG" dirty="0">
+                <a:solidFill>
+                  <a:schemeClr val="bg1">
+                    <a:lumMod val="65000"/>
+                  </a:schemeClr>
+                </a:solidFill>
+              </a:endParaRPr>
+            </a:p>
+          </p:txBody>
+        </p:sp>
+        <p:sp>
+          <p:nvSpPr>
+            <p:cNvPr id="32" name="Pentagon 31"/>
+            <p:cNvSpPr/>
+            <p:nvPr/>
+          </p:nvSpPr>
+          <p:spPr>
+            <a:xfrm>
+              <a:off x="1187624" y="5661248"/>
+              <a:ext cx="4392488" cy="288032"/>
+            </a:xfrm>
+            <a:prstGeom prst="homePlate">
+              <a:avLst/>
+            </a:prstGeom>
+            <a:solidFill>
+              <a:schemeClr val="bg1">
+                <a:lumMod val="65000"/>
+              </a:schemeClr>
+            </a:solidFill>
+            <a:ln>
+              <a:solidFill>
+                <a:schemeClr val="bg1">
+                  <a:lumMod val="65000"/>
+                </a:schemeClr>
+              </a:solidFill>
+            </a:ln>
+          </p:spPr>
+          <p:style>
+            <a:lnRef idx="2">
+              <a:schemeClr val="accent1">
+                <a:shade val="50000"/>
+              </a:schemeClr>
+            </a:lnRef>
+            <a:fillRef idx="1">
+              <a:schemeClr val="accent1"/>
+            </a:fillRef>
+            <a:effectRef idx="0">
+              <a:schemeClr val="accent1"/>
+            </a:effectRef>
+            <a:fontRef idx="minor">
+              <a:schemeClr val="lt1"/>
+            </a:fontRef>
+          </p:style>
+          <p:txBody>
+            <a:bodyPr rtlCol="0" anchor="ctr"/>
+            <a:lstStyle/>
+            <a:p>
+              <a:pPr algn="ctr"/>
+              <a:r>
+                <a:rPr lang="en-US" dirty="0" smtClean="0"/>
+                <a:t>8 months</a:t>
+              </a:r>
+              <a:endParaRPr lang="en-SG" dirty="0"/>
+            </a:p>
+          </p:txBody>
+        </p:sp>
+        <p:sp>
+          <p:nvSpPr>
+            <p:cNvPr id="33" name="TextBox 32"/>
+            <p:cNvSpPr txBox="1"/>
+            <p:nvPr/>
+          </p:nvSpPr>
+          <p:spPr>
+            <a:xfrm>
+              <a:off x="827584" y="5301208"/>
+              <a:ext cx="963812" cy="369332"/>
+            </a:xfrm>
+            <a:prstGeom prst="rect">
+              <a:avLst/>
+            </a:prstGeom>
+            <a:noFill/>
+          </p:spPr>
+          <p:txBody>
+            <a:bodyPr wrap="square" rtlCol="0">
+              <a:spAutoFit/>
+            </a:bodyPr>
+            <a:lstStyle/>
+            <a:p>
+              <a:r>
+                <a:rPr lang="en-US" dirty="0" smtClean="0">
+                  <a:solidFill>
+                    <a:schemeClr val="bg1">
+                      <a:lumMod val="65000"/>
+                    </a:schemeClr>
+                  </a:solidFill>
+                </a:rPr>
+                <a:t>Kickoff</a:t>
+              </a:r>
+              <a:endParaRPr lang="en-SG" dirty="0">
+                <a:solidFill>
+                  <a:schemeClr val="bg1">
+                    <a:lumMod val="65000"/>
+                  </a:schemeClr>
+                </a:solidFill>
+              </a:endParaRPr>
+            </a:p>
+          </p:txBody>
+        </p:sp>
+        <p:sp>
+          <p:nvSpPr>
+            <p:cNvPr id="34" name="TextBox 33"/>
+            <p:cNvSpPr txBox="1"/>
+            <p:nvPr/>
+          </p:nvSpPr>
+          <p:spPr>
+            <a:xfrm>
+              <a:off x="5120356" y="5301208"/>
+              <a:ext cx="675780" cy="369332"/>
+            </a:xfrm>
+            <a:prstGeom prst="rect">
+              <a:avLst/>
+            </a:prstGeom>
+            <a:noFill/>
+          </p:spPr>
+          <p:txBody>
+            <a:bodyPr wrap="square" rtlCol="0">
+              <a:spAutoFit/>
+            </a:bodyPr>
+            <a:lstStyle/>
+            <a:p>
+              <a:r>
+                <a:rPr lang="en-US" dirty="0" smtClean="0">
+                  <a:solidFill>
+                    <a:schemeClr val="bg1">
+                      <a:lumMod val="65000"/>
+                    </a:schemeClr>
+                  </a:solidFill>
+                </a:rPr>
+                <a:t>Now</a:t>
+              </a:r>
+              <a:endParaRPr lang="en-SG" dirty="0">
+                <a:solidFill>
+                  <a:schemeClr val="bg1">
+                    <a:lumMod val="65000"/>
+                  </a:schemeClr>
+                </a:solidFill>
+              </a:endParaRPr>
+            </a:p>
+          </p:txBody>
+        </p:sp>
+      </p:grpSp>
     </p:spTree>
     <p:extLst>
       <p:ext uri="{BB962C8B-B14F-4D97-AF65-F5344CB8AC3E}">
@@ -21446,6 +24338,7 @@
               <a:rPr lang="en-SG"/>
               <a:t>Project Progress Report</a:t>
             </a:r>
+            <a:endParaRPr lang="en-SG"/>
           </a:p>
         </p:txBody>
       </p:sp>
@@ -21674,6 +24567,268 @@
           </a:p>
         </p:txBody>
       </p:sp>
+      <p:grpSp>
+        <p:nvGrpSpPr>
+          <p:cNvPr id="29" name="Unnamed Shape 20150713135318707214"/>
+          <p:cNvGrpSpPr/>
+          <p:nvPr/>
+        </p:nvGrpSpPr>
+        <p:grpSpPr>
+          <a:xfrm>
+            <a:off x="827584" y="5291916"/>
+            <a:ext cx="7488832" cy="657364"/>
+            <a:chOff x="827584" y="5291916"/>
+            <a:chExt cx="7488832" cy="657364"/>
+          </a:xfrm>
+        </p:grpSpPr>
+        <p:sp>
+          <p:nvSpPr>
+            <p:cNvPr id="30" name="Rectangle 29"/>
+            <p:cNvSpPr/>
+            <p:nvPr/>
+          </p:nvSpPr>
+          <p:spPr>
+            <a:xfrm>
+              <a:off x="5436096" y="5661248"/>
+              <a:ext cx="2376264" cy="288032"/>
+            </a:xfrm>
+            <a:prstGeom prst="rect">
+              <a:avLst/>
+            </a:prstGeom>
+            <a:noFill/>
+            <a:ln>
+              <a:solidFill>
+                <a:schemeClr val="bg1">
+                  <a:lumMod val="65000"/>
+                </a:schemeClr>
+              </a:solidFill>
+            </a:ln>
+          </p:spPr>
+          <p:style>
+            <a:lnRef idx="2">
+              <a:schemeClr val="accent1">
+                <a:shade val="50000"/>
+              </a:schemeClr>
+            </a:lnRef>
+            <a:fillRef idx="1">
+              <a:schemeClr val="accent1"/>
+            </a:fillRef>
+            <a:effectRef idx="0">
+              <a:schemeClr val="accent1"/>
+            </a:effectRef>
+            <a:fontRef idx="minor">
+              <a:schemeClr val="lt1"/>
+            </a:fontRef>
+          </p:style>
+          <p:txBody>
+            <a:bodyPr rtlCol="0" anchor="ctr"/>
+            <a:lstStyle/>
+            <a:p>
+              <a:pPr algn="ctr"/>
+              <a:r>
+                <a:rPr lang="en-US" dirty="0" smtClean="0">
+                  <a:solidFill>
+                    <a:schemeClr val="bg1">
+                      <a:lumMod val="65000"/>
+                    </a:schemeClr>
+                  </a:solidFill>
+                </a:rPr>
+                <a:t>2.5 months</a:t>
+              </a:r>
+              <a:endParaRPr lang="en-SG" dirty="0">
+                <a:solidFill>
+                  <a:schemeClr val="bg1">
+                    <a:lumMod val="65000"/>
+                  </a:schemeClr>
+                </a:solidFill>
+              </a:endParaRPr>
+            </a:p>
+          </p:txBody>
+        </p:sp>
+        <p:sp>
+          <p:nvSpPr>
+            <p:cNvPr id="31" name="TextBox 30"/>
+            <p:cNvSpPr txBox="1"/>
+            <p:nvPr/>
+          </p:nvSpPr>
+          <p:spPr>
+            <a:xfrm>
+              <a:off x="7251436" y="5291916"/>
+              <a:ext cx="1064980" cy="369332"/>
+            </a:xfrm>
+            <a:prstGeom prst="rect">
+              <a:avLst/>
+            </a:prstGeom>
+            <a:noFill/>
+          </p:spPr>
+          <p:txBody>
+            <a:bodyPr wrap="square" rtlCol="0">
+              <a:spAutoFit/>
+            </a:bodyPr>
+            <a:lstStyle/>
+            <a:p>
+              <a:pPr algn="r"/>
+              <a:r>
+                <a:rPr lang="en-US" dirty="0" smtClean="0">
+                  <a:solidFill>
+                    <a:schemeClr val="bg1">
+                      <a:lumMod val="65000"/>
+                    </a:schemeClr>
+                  </a:solidFill>
+                </a:rPr>
+                <a:t>Deadline</a:t>
+              </a:r>
+              <a:endParaRPr lang="en-SG" dirty="0">
+                <a:solidFill>
+                  <a:schemeClr val="bg1">
+                    <a:lumMod val="65000"/>
+                  </a:schemeClr>
+                </a:solidFill>
+              </a:endParaRPr>
+            </a:p>
+          </p:txBody>
+        </p:sp>
+        <p:sp>
+          <p:nvSpPr>
+            <p:cNvPr id="32" name="Pentagon 31"/>
+            <p:cNvSpPr/>
+            <p:nvPr/>
+          </p:nvSpPr>
+          <p:spPr>
+            <a:xfrm>
+              <a:off x="1187624" y="5661248"/>
+              <a:ext cx="4392488" cy="288032"/>
+            </a:xfrm>
+            <a:prstGeom prst="homePlate">
+              <a:avLst/>
+            </a:prstGeom>
+            <a:solidFill>
+              <a:schemeClr val="bg1">
+                <a:lumMod val="65000"/>
+              </a:schemeClr>
+            </a:solidFill>
+            <a:ln>
+              <a:solidFill>
+                <a:schemeClr val="bg1">
+                  <a:lumMod val="65000"/>
+                </a:schemeClr>
+              </a:solidFill>
+            </a:ln>
+          </p:spPr>
+          <p:style>
+            <a:lnRef idx="2">
+              <a:schemeClr val="accent1">
+                <a:shade val="50000"/>
+              </a:schemeClr>
+            </a:lnRef>
+            <a:fillRef idx="1">
+              <a:schemeClr val="accent1"/>
+            </a:fillRef>
+            <a:effectRef idx="0">
+              <a:schemeClr val="accent1"/>
+            </a:effectRef>
+            <a:fontRef idx="minor">
+              <a:schemeClr val="lt1"/>
+            </a:fontRef>
+          </p:style>
+          <p:txBody>
+            <a:bodyPr rtlCol="0" anchor="ctr"/>
+            <a:lstStyle/>
+            <a:p>
+              <a:pPr algn="ctr"/>
+              <a:r>
+                <a:rPr lang="en-US" dirty="0" smtClean="0"/>
+                <a:t>8 months</a:t>
+              </a:r>
+              <a:endParaRPr lang="en-SG" dirty="0"/>
+            </a:p>
+          </p:txBody>
+        </p:sp>
+        <p:sp>
+          <p:nvSpPr>
+            <p:cNvPr id="33" name="TextBox 32"/>
+            <p:cNvSpPr txBox="1"/>
+            <p:nvPr/>
+          </p:nvSpPr>
+          <p:spPr>
+            <a:xfrm>
+              <a:off x="827584" y="5301208"/>
+              <a:ext cx="963812" cy="369332"/>
+            </a:xfrm>
+            <a:prstGeom prst="rect">
+              <a:avLst/>
+            </a:prstGeom>
+            <a:noFill/>
+          </p:spPr>
+          <p:txBody>
+            <a:bodyPr wrap="square" rtlCol="0">
+              <a:spAutoFit/>
+            </a:bodyPr>
+            <a:lstStyle/>
+            <a:p>
+              <a:r>
+                <a:rPr lang="en-US" dirty="0" smtClean="0">
+                  <a:solidFill>
+                    <a:schemeClr val="bg1">
+                      <a:lumMod val="65000"/>
+                    </a:schemeClr>
+                  </a:solidFill>
+                </a:rPr>
+                <a:t>Kickoff</a:t>
+              </a:r>
+              <a:endParaRPr lang="en-SG" dirty="0">
+                <a:solidFill>
+                  <a:schemeClr val="bg1">
+                    <a:lumMod val="65000"/>
+                  </a:schemeClr>
+                </a:solidFill>
+              </a:endParaRPr>
+            </a:p>
+          </p:txBody>
+        </p:sp>
+        <p:sp>
+          <p:nvSpPr>
+            <p:cNvPr id="34" name="TextBox 33"/>
+            <p:cNvSpPr txBox="1"/>
+            <p:nvPr/>
+          </p:nvSpPr>
+          <p:spPr>
+            <a:xfrm>
+              <a:off x="5120356" y="5301208"/>
+              <a:ext cx="675780" cy="369332"/>
+            </a:xfrm>
+            <a:prstGeom prst="rect">
+              <a:avLst/>
+            </a:prstGeom>
+            <a:noFill/>
+          </p:spPr>
+          <p:txBody>
+            <a:bodyPr wrap="square" rtlCol="0">
+              <a:spAutoFit/>
+            </a:bodyPr>
+            <a:lstStyle/>
+            <a:p>
+              <a:r>
+                <a:rPr lang="en-US" dirty="0" smtClean="0">
+                  <a:solidFill>
+                    <a:schemeClr val="bg1">
+                      <a:lumMod val="65000"/>
+                    </a:schemeClr>
+                  </a:solidFill>
+                </a:rPr>
+                <a:t>Now</a:t>
+              </a:r>
+              <a:endParaRPr lang="en-SG" dirty="0">
+                <a:solidFill>
+                  <a:schemeClr val="bg1">
+                    <a:lumMod val="65000"/>
+                  </a:schemeClr>
+                </a:solidFill>
+              </a:endParaRPr>
+            </a:p>
+          </p:txBody>
+        </p:sp>
+      </p:grpSp>
     </p:spTree>
     <p:extLst>
       <p:ext uri="{BB962C8B-B14F-4D97-AF65-F5344CB8AC3E}">
@@ -21843,8 +24998,8 @@
         </p:blipFill>
         <p:spPr>
           <a:xfrm>
-            <a:off x="1078672" y="1268760"/>
-            <a:ext cx="6984776" cy="4320480"/>
+            <a:off x="649224" y="992124"/>
+            <a:ext cx="7845552" cy="4873752"/>
           </a:xfrm>
           <a:prstGeom prst="rect">
             <a:avLst/>
@@ -21854,28 +25009,21 @@
     </p:spTree>
     <p:extLst>
       <p:ext uri="{BB962C8B-B14F-4D97-AF65-F5344CB8AC3E}">
-        <p14:creationId xmlns:p14="http://schemas.microsoft.com/office/powerpoint/2010/main" val="3745764501"/>
+        <p14:creationId xmlns:p14="http://schemas.microsoft.com/office/powerpoint/2010/main" val="3332830591"/>
       </p:ext>
     </p:extLst>
   </p:cSld>
   <p:clrMapOvr>
     <a:masterClrMapping/>
   </p:clrMapOvr>
-  <mc:AlternateContent xmlns:mc="http://schemas.openxmlformats.org/markup-compatibility/2006" xmlns:p14="http://schemas.microsoft.com/office/powerpoint/2010/main">
-    <mc:Choice Requires="p14">
+  <mc:AlternateContent xmlns:mc="http://schemas.openxmlformats.org/markup-compatibility/2006">
+    <mc:Choice xmlns:p14="http://schemas.microsoft.com/office/powerpoint/2010/main" Requires="p14">
       <p:transition spd="slow" p14:dur="2000"/>
     </mc:Choice>
-    <mc:Fallback xmlns="">
+    <mc:Fallback>
       <p:transition spd="slow"/>
     </mc:Fallback>
   </mc:AlternateContent>
-  <p:timing>
-    <p:tnLst>
-      <p:par>
-        <p:cTn id="1" dur="indefinite" restart="never" nodeType="tmRoot"/>
-      </p:par>
-    </p:tnLst>
-  </p:timing>
 </p:sld>
 </file>
 
@@ -22024,6 +25172,7 @@
               <a:rPr lang="en-SG"/>
               <a:t>Project Progress Report</a:t>
             </a:r>
+            <a:endParaRPr lang="en-SG"/>
           </a:p>
         </p:txBody>
       </p:sp>
@@ -22438,6 +25587,268 @@
           </a:p>
         </p:txBody>
       </p:sp>
+      <p:grpSp>
+        <p:nvGrpSpPr>
+          <p:cNvPr id="32" name="Unnamed Shape 20150713135318707214"/>
+          <p:cNvGrpSpPr/>
+          <p:nvPr/>
+        </p:nvGrpSpPr>
+        <p:grpSpPr>
+          <a:xfrm>
+            <a:off x="827584" y="5291916"/>
+            <a:ext cx="7488832" cy="657364"/>
+            <a:chOff x="827584" y="5291916"/>
+            <a:chExt cx="7488832" cy="657364"/>
+          </a:xfrm>
+        </p:grpSpPr>
+        <p:sp>
+          <p:nvSpPr>
+            <p:cNvPr id="33" name="Rectangle 32"/>
+            <p:cNvSpPr/>
+            <p:nvPr/>
+          </p:nvSpPr>
+          <p:spPr>
+            <a:xfrm>
+              <a:off x="5436096" y="5661248"/>
+              <a:ext cx="2376264" cy="288032"/>
+            </a:xfrm>
+            <a:prstGeom prst="rect">
+              <a:avLst/>
+            </a:prstGeom>
+            <a:noFill/>
+            <a:ln>
+              <a:solidFill>
+                <a:schemeClr val="bg1">
+                  <a:lumMod val="65000"/>
+                </a:schemeClr>
+              </a:solidFill>
+            </a:ln>
+          </p:spPr>
+          <p:style>
+            <a:lnRef idx="2">
+              <a:schemeClr val="accent1">
+                <a:shade val="50000"/>
+              </a:schemeClr>
+            </a:lnRef>
+            <a:fillRef idx="1">
+              <a:schemeClr val="accent1"/>
+            </a:fillRef>
+            <a:effectRef idx="0">
+              <a:schemeClr val="accent1"/>
+            </a:effectRef>
+            <a:fontRef idx="minor">
+              <a:schemeClr val="lt1"/>
+            </a:fontRef>
+          </p:style>
+          <p:txBody>
+            <a:bodyPr rtlCol="0" anchor="ctr"/>
+            <a:lstStyle/>
+            <a:p>
+              <a:pPr algn="ctr"/>
+              <a:r>
+                <a:rPr lang="en-US" dirty="0" smtClean="0">
+                  <a:solidFill>
+                    <a:schemeClr val="bg1">
+                      <a:lumMod val="65000"/>
+                    </a:schemeClr>
+                  </a:solidFill>
+                </a:rPr>
+                <a:t>2.5 months</a:t>
+              </a:r>
+              <a:endParaRPr lang="en-SG" dirty="0">
+                <a:solidFill>
+                  <a:schemeClr val="bg1">
+                    <a:lumMod val="65000"/>
+                  </a:schemeClr>
+                </a:solidFill>
+              </a:endParaRPr>
+            </a:p>
+          </p:txBody>
+        </p:sp>
+        <p:sp>
+          <p:nvSpPr>
+            <p:cNvPr id="34" name="TextBox 33"/>
+            <p:cNvSpPr txBox="1"/>
+            <p:nvPr/>
+          </p:nvSpPr>
+          <p:spPr>
+            <a:xfrm>
+              <a:off x="7251436" y="5291916"/>
+              <a:ext cx="1064980" cy="369332"/>
+            </a:xfrm>
+            <a:prstGeom prst="rect">
+              <a:avLst/>
+            </a:prstGeom>
+            <a:noFill/>
+          </p:spPr>
+          <p:txBody>
+            <a:bodyPr wrap="square" rtlCol="0">
+              <a:spAutoFit/>
+            </a:bodyPr>
+            <a:lstStyle/>
+            <a:p>
+              <a:pPr algn="r"/>
+              <a:r>
+                <a:rPr lang="en-US" dirty="0" smtClean="0">
+                  <a:solidFill>
+                    <a:schemeClr val="bg1">
+                      <a:lumMod val="65000"/>
+                    </a:schemeClr>
+                  </a:solidFill>
+                </a:rPr>
+                <a:t>Deadline</a:t>
+              </a:r>
+              <a:endParaRPr lang="en-SG" dirty="0">
+                <a:solidFill>
+                  <a:schemeClr val="bg1">
+                    <a:lumMod val="65000"/>
+                  </a:schemeClr>
+                </a:solidFill>
+              </a:endParaRPr>
+            </a:p>
+          </p:txBody>
+        </p:sp>
+        <p:sp>
+          <p:nvSpPr>
+            <p:cNvPr id="35" name="Pentagon 34"/>
+            <p:cNvSpPr/>
+            <p:nvPr/>
+          </p:nvSpPr>
+          <p:spPr>
+            <a:xfrm>
+              <a:off x="1187624" y="5661248"/>
+              <a:ext cx="4392488" cy="288032"/>
+            </a:xfrm>
+            <a:prstGeom prst="homePlate">
+              <a:avLst/>
+            </a:prstGeom>
+            <a:solidFill>
+              <a:schemeClr val="bg1">
+                <a:lumMod val="65000"/>
+              </a:schemeClr>
+            </a:solidFill>
+            <a:ln>
+              <a:solidFill>
+                <a:schemeClr val="bg1">
+                  <a:lumMod val="65000"/>
+                </a:schemeClr>
+              </a:solidFill>
+            </a:ln>
+          </p:spPr>
+          <p:style>
+            <a:lnRef idx="2">
+              <a:schemeClr val="accent1">
+                <a:shade val="50000"/>
+              </a:schemeClr>
+            </a:lnRef>
+            <a:fillRef idx="1">
+              <a:schemeClr val="accent1"/>
+            </a:fillRef>
+            <a:effectRef idx="0">
+              <a:schemeClr val="accent1"/>
+            </a:effectRef>
+            <a:fontRef idx="minor">
+              <a:schemeClr val="lt1"/>
+            </a:fontRef>
+          </p:style>
+          <p:txBody>
+            <a:bodyPr rtlCol="0" anchor="ctr"/>
+            <a:lstStyle/>
+            <a:p>
+              <a:pPr algn="ctr"/>
+              <a:r>
+                <a:rPr lang="en-US" dirty="0" smtClean="0"/>
+                <a:t>8 months</a:t>
+              </a:r>
+              <a:endParaRPr lang="en-SG" dirty="0"/>
+            </a:p>
+          </p:txBody>
+        </p:sp>
+        <p:sp>
+          <p:nvSpPr>
+            <p:cNvPr id="36" name="TextBox 35"/>
+            <p:cNvSpPr txBox="1"/>
+            <p:nvPr/>
+          </p:nvSpPr>
+          <p:spPr>
+            <a:xfrm>
+              <a:off x="827584" y="5301208"/>
+              <a:ext cx="963812" cy="369332"/>
+            </a:xfrm>
+            <a:prstGeom prst="rect">
+              <a:avLst/>
+            </a:prstGeom>
+            <a:noFill/>
+          </p:spPr>
+          <p:txBody>
+            <a:bodyPr wrap="square" rtlCol="0">
+              <a:spAutoFit/>
+            </a:bodyPr>
+            <a:lstStyle/>
+            <a:p>
+              <a:r>
+                <a:rPr lang="en-US" dirty="0" smtClean="0">
+                  <a:solidFill>
+                    <a:schemeClr val="bg1">
+                      <a:lumMod val="65000"/>
+                    </a:schemeClr>
+                  </a:solidFill>
+                </a:rPr>
+                <a:t>Kickoff</a:t>
+              </a:r>
+              <a:endParaRPr lang="en-SG" dirty="0">
+                <a:solidFill>
+                  <a:schemeClr val="bg1">
+                    <a:lumMod val="65000"/>
+                  </a:schemeClr>
+                </a:solidFill>
+              </a:endParaRPr>
+            </a:p>
+          </p:txBody>
+        </p:sp>
+        <p:sp>
+          <p:nvSpPr>
+            <p:cNvPr id="37" name="TextBox 36"/>
+            <p:cNvSpPr txBox="1"/>
+            <p:nvPr/>
+          </p:nvSpPr>
+          <p:spPr>
+            <a:xfrm>
+              <a:off x="5120356" y="5301208"/>
+              <a:ext cx="675780" cy="369332"/>
+            </a:xfrm>
+            <a:prstGeom prst="rect">
+              <a:avLst/>
+            </a:prstGeom>
+            <a:noFill/>
+          </p:spPr>
+          <p:txBody>
+            <a:bodyPr wrap="square" rtlCol="0">
+              <a:spAutoFit/>
+            </a:bodyPr>
+            <a:lstStyle/>
+            <a:p>
+              <a:r>
+                <a:rPr lang="en-US" dirty="0" smtClean="0">
+                  <a:solidFill>
+                    <a:schemeClr val="bg1">
+                      <a:lumMod val="65000"/>
+                    </a:schemeClr>
+                  </a:solidFill>
+                </a:rPr>
+                <a:t>Now</a:t>
+              </a:r>
+              <a:endParaRPr lang="en-SG" dirty="0">
+                <a:solidFill>
+                  <a:schemeClr val="bg1">
+                    <a:lumMod val="65000"/>
+                  </a:schemeClr>
+                </a:solidFill>
+              </a:endParaRPr>
+            </a:p>
+          </p:txBody>
+        </p:sp>
+      </p:grpSp>
     </p:spTree>
     <p:extLst>
       <p:ext uri="{BB962C8B-B14F-4D97-AF65-F5344CB8AC3E}">
@@ -23210,6 +26621,7 @@
               <a:rPr lang="en-SG"/>
               <a:t>Project Progress Report</a:t>
             </a:r>
+            <a:endParaRPr lang="en-SG"/>
           </a:p>
         </p:txBody>
       </p:sp>
@@ -23616,6 +27028,268 @@
           </a:p>
         </p:txBody>
       </p:sp>
+      <p:grpSp>
+        <p:nvGrpSpPr>
+          <p:cNvPr id="32" name="Unnamed Shape 20150713135318707214"/>
+          <p:cNvGrpSpPr/>
+          <p:nvPr/>
+        </p:nvGrpSpPr>
+        <p:grpSpPr>
+          <a:xfrm>
+            <a:off x="827584" y="5291916"/>
+            <a:ext cx="7488832" cy="657364"/>
+            <a:chOff x="827584" y="5291916"/>
+            <a:chExt cx="7488832" cy="657364"/>
+          </a:xfrm>
+        </p:grpSpPr>
+        <p:sp>
+          <p:nvSpPr>
+            <p:cNvPr id="33" name="Rectangle 32"/>
+            <p:cNvSpPr/>
+            <p:nvPr/>
+          </p:nvSpPr>
+          <p:spPr>
+            <a:xfrm>
+              <a:off x="5436096" y="5661248"/>
+              <a:ext cx="2376264" cy="288032"/>
+            </a:xfrm>
+            <a:prstGeom prst="rect">
+              <a:avLst/>
+            </a:prstGeom>
+            <a:noFill/>
+            <a:ln>
+              <a:solidFill>
+                <a:schemeClr val="bg1">
+                  <a:lumMod val="65000"/>
+                </a:schemeClr>
+              </a:solidFill>
+            </a:ln>
+          </p:spPr>
+          <p:style>
+            <a:lnRef idx="2">
+              <a:schemeClr val="accent1">
+                <a:shade val="50000"/>
+              </a:schemeClr>
+            </a:lnRef>
+            <a:fillRef idx="1">
+              <a:schemeClr val="accent1"/>
+            </a:fillRef>
+            <a:effectRef idx="0">
+              <a:schemeClr val="accent1"/>
+            </a:effectRef>
+            <a:fontRef idx="minor">
+              <a:schemeClr val="lt1"/>
+            </a:fontRef>
+          </p:style>
+          <p:txBody>
+            <a:bodyPr rtlCol="0" anchor="ctr"/>
+            <a:lstStyle/>
+            <a:p>
+              <a:pPr algn="ctr"/>
+              <a:r>
+                <a:rPr lang="en-US" dirty="0" smtClean="0">
+                  <a:solidFill>
+                    <a:schemeClr val="bg1">
+                      <a:lumMod val="65000"/>
+                    </a:schemeClr>
+                  </a:solidFill>
+                </a:rPr>
+                <a:t>2.5 months</a:t>
+              </a:r>
+              <a:endParaRPr lang="en-SG" dirty="0">
+                <a:solidFill>
+                  <a:schemeClr val="bg1">
+                    <a:lumMod val="65000"/>
+                  </a:schemeClr>
+                </a:solidFill>
+              </a:endParaRPr>
+            </a:p>
+          </p:txBody>
+        </p:sp>
+        <p:sp>
+          <p:nvSpPr>
+            <p:cNvPr id="34" name="TextBox 33"/>
+            <p:cNvSpPr txBox="1"/>
+            <p:nvPr/>
+          </p:nvSpPr>
+          <p:spPr>
+            <a:xfrm>
+              <a:off x="7251436" y="5291916"/>
+              <a:ext cx="1064980" cy="369332"/>
+            </a:xfrm>
+            <a:prstGeom prst="rect">
+              <a:avLst/>
+            </a:prstGeom>
+            <a:noFill/>
+          </p:spPr>
+          <p:txBody>
+            <a:bodyPr wrap="square" rtlCol="0">
+              <a:spAutoFit/>
+            </a:bodyPr>
+            <a:lstStyle/>
+            <a:p>
+              <a:pPr algn="r"/>
+              <a:r>
+                <a:rPr lang="en-US" dirty="0" smtClean="0">
+                  <a:solidFill>
+                    <a:schemeClr val="bg1">
+                      <a:lumMod val="65000"/>
+                    </a:schemeClr>
+                  </a:solidFill>
+                </a:rPr>
+                <a:t>Deadline</a:t>
+              </a:r>
+              <a:endParaRPr lang="en-SG" dirty="0">
+                <a:solidFill>
+                  <a:schemeClr val="bg1">
+                    <a:lumMod val="65000"/>
+                  </a:schemeClr>
+                </a:solidFill>
+              </a:endParaRPr>
+            </a:p>
+          </p:txBody>
+        </p:sp>
+        <p:sp>
+          <p:nvSpPr>
+            <p:cNvPr id="35" name="Pentagon 34"/>
+            <p:cNvSpPr/>
+            <p:nvPr/>
+          </p:nvSpPr>
+          <p:spPr>
+            <a:xfrm>
+              <a:off x="1187624" y="5661248"/>
+              <a:ext cx="4392488" cy="288032"/>
+            </a:xfrm>
+            <a:prstGeom prst="homePlate">
+              <a:avLst/>
+            </a:prstGeom>
+            <a:solidFill>
+              <a:schemeClr val="bg1">
+                <a:lumMod val="65000"/>
+              </a:schemeClr>
+            </a:solidFill>
+            <a:ln>
+              <a:solidFill>
+                <a:schemeClr val="bg1">
+                  <a:lumMod val="65000"/>
+                </a:schemeClr>
+              </a:solidFill>
+            </a:ln>
+          </p:spPr>
+          <p:style>
+            <a:lnRef idx="2">
+              <a:schemeClr val="accent1">
+                <a:shade val="50000"/>
+              </a:schemeClr>
+            </a:lnRef>
+            <a:fillRef idx="1">
+              <a:schemeClr val="accent1"/>
+            </a:fillRef>
+            <a:effectRef idx="0">
+              <a:schemeClr val="accent1"/>
+            </a:effectRef>
+            <a:fontRef idx="minor">
+              <a:schemeClr val="lt1"/>
+            </a:fontRef>
+          </p:style>
+          <p:txBody>
+            <a:bodyPr rtlCol="0" anchor="ctr"/>
+            <a:lstStyle/>
+            <a:p>
+              <a:pPr algn="ctr"/>
+              <a:r>
+                <a:rPr lang="en-US" dirty="0" smtClean="0"/>
+                <a:t>8 months</a:t>
+              </a:r>
+              <a:endParaRPr lang="en-SG" dirty="0"/>
+            </a:p>
+          </p:txBody>
+        </p:sp>
+        <p:sp>
+          <p:nvSpPr>
+            <p:cNvPr id="36" name="TextBox 35"/>
+            <p:cNvSpPr txBox="1"/>
+            <p:nvPr/>
+          </p:nvSpPr>
+          <p:spPr>
+            <a:xfrm>
+              <a:off x="827584" y="5301208"/>
+              <a:ext cx="963812" cy="369332"/>
+            </a:xfrm>
+            <a:prstGeom prst="rect">
+              <a:avLst/>
+            </a:prstGeom>
+            <a:noFill/>
+          </p:spPr>
+          <p:txBody>
+            <a:bodyPr wrap="square" rtlCol="0">
+              <a:spAutoFit/>
+            </a:bodyPr>
+            <a:lstStyle/>
+            <a:p>
+              <a:r>
+                <a:rPr lang="en-US" dirty="0" smtClean="0">
+                  <a:solidFill>
+                    <a:schemeClr val="bg1">
+                      <a:lumMod val="65000"/>
+                    </a:schemeClr>
+                  </a:solidFill>
+                </a:rPr>
+                <a:t>Kickoff</a:t>
+              </a:r>
+              <a:endParaRPr lang="en-SG" dirty="0">
+                <a:solidFill>
+                  <a:schemeClr val="bg1">
+                    <a:lumMod val="65000"/>
+                  </a:schemeClr>
+                </a:solidFill>
+              </a:endParaRPr>
+            </a:p>
+          </p:txBody>
+        </p:sp>
+        <p:sp>
+          <p:nvSpPr>
+            <p:cNvPr id="37" name="TextBox 36"/>
+            <p:cNvSpPr txBox="1"/>
+            <p:nvPr/>
+          </p:nvSpPr>
+          <p:spPr>
+            <a:xfrm>
+              <a:off x="5120356" y="5301208"/>
+              <a:ext cx="675780" cy="369332"/>
+            </a:xfrm>
+            <a:prstGeom prst="rect">
+              <a:avLst/>
+            </a:prstGeom>
+            <a:noFill/>
+          </p:spPr>
+          <p:txBody>
+            <a:bodyPr wrap="square" rtlCol="0">
+              <a:spAutoFit/>
+            </a:bodyPr>
+            <a:lstStyle/>
+            <a:p>
+              <a:r>
+                <a:rPr lang="en-US" dirty="0" smtClean="0">
+                  <a:solidFill>
+                    <a:schemeClr val="bg1">
+                      <a:lumMod val="65000"/>
+                    </a:schemeClr>
+                  </a:solidFill>
+                </a:rPr>
+                <a:t>Now</a:t>
+              </a:r>
+              <a:endParaRPr lang="en-SG" dirty="0">
+                <a:solidFill>
+                  <a:schemeClr val="bg1">
+                    <a:lumMod val="65000"/>
+                  </a:schemeClr>
+                </a:solidFill>
+              </a:endParaRPr>
+            </a:p>
+          </p:txBody>
+        </p:sp>
+      </p:grpSp>
     </p:spTree>
     <p:extLst>
       <p:ext uri="{BB962C8B-B14F-4D97-AF65-F5344CB8AC3E}">
@@ -23882,6 +27556,7 @@
               <a:rPr lang="en-SG"/>
               <a:t>Project Progress Report</a:t>
             </a:r>
+            <a:endParaRPr lang="en-SG"/>
           </a:p>
         </p:txBody>
       </p:sp>
@@ -24233,6 +27908,268 @@
           </a:extLst>
         </p:spPr>
       </p:pic>
+      <p:grpSp>
+        <p:nvGrpSpPr>
+          <p:cNvPr id="31" name="Unnamed Shape 20150713135318707214"/>
+          <p:cNvGrpSpPr/>
+          <p:nvPr/>
+        </p:nvGrpSpPr>
+        <p:grpSpPr>
+          <a:xfrm>
+            <a:off x="827584" y="5291916"/>
+            <a:ext cx="7488832" cy="657364"/>
+            <a:chOff x="827584" y="5291916"/>
+            <a:chExt cx="7488832" cy="657364"/>
+          </a:xfrm>
+        </p:grpSpPr>
+        <p:sp>
+          <p:nvSpPr>
+            <p:cNvPr id="32" name="Rectangle 31"/>
+            <p:cNvSpPr/>
+            <p:nvPr/>
+          </p:nvSpPr>
+          <p:spPr>
+            <a:xfrm>
+              <a:off x="5436096" y="5661248"/>
+              <a:ext cx="2376264" cy="288032"/>
+            </a:xfrm>
+            <a:prstGeom prst="rect">
+              <a:avLst/>
+            </a:prstGeom>
+            <a:noFill/>
+            <a:ln>
+              <a:solidFill>
+                <a:schemeClr val="bg1">
+                  <a:lumMod val="65000"/>
+                </a:schemeClr>
+              </a:solidFill>
+            </a:ln>
+          </p:spPr>
+          <p:style>
+            <a:lnRef idx="2">
+              <a:schemeClr val="accent1">
+                <a:shade val="50000"/>
+              </a:schemeClr>
+            </a:lnRef>
+            <a:fillRef idx="1">
+              <a:schemeClr val="accent1"/>
+            </a:fillRef>
+            <a:effectRef idx="0">
+              <a:schemeClr val="accent1"/>
+            </a:effectRef>
+            <a:fontRef idx="minor">
+              <a:schemeClr val="lt1"/>
+            </a:fontRef>
+          </p:style>
+          <p:txBody>
+            <a:bodyPr rtlCol="0" anchor="ctr"/>
+            <a:lstStyle/>
+            <a:p>
+              <a:pPr algn="ctr"/>
+              <a:r>
+                <a:rPr lang="en-US" dirty="0" smtClean="0">
+                  <a:solidFill>
+                    <a:schemeClr val="bg1">
+                      <a:lumMod val="65000"/>
+                    </a:schemeClr>
+                  </a:solidFill>
+                </a:rPr>
+                <a:t>2.5 months</a:t>
+              </a:r>
+              <a:endParaRPr lang="en-SG" dirty="0">
+                <a:solidFill>
+                  <a:schemeClr val="bg1">
+                    <a:lumMod val="65000"/>
+                  </a:schemeClr>
+                </a:solidFill>
+              </a:endParaRPr>
+            </a:p>
+          </p:txBody>
+        </p:sp>
+        <p:sp>
+          <p:nvSpPr>
+            <p:cNvPr id="33" name="TextBox 32"/>
+            <p:cNvSpPr txBox="1"/>
+            <p:nvPr/>
+          </p:nvSpPr>
+          <p:spPr>
+            <a:xfrm>
+              <a:off x="7251436" y="5291916"/>
+              <a:ext cx="1064980" cy="369332"/>
+            </a:xfrm>
+            <a:prstGeom prst="rect">
+              <a:avLst/>
+            </a:prstGeom>
+            <a:noFill/>
+          </p:spPr>
+          <p:txBody>
+            <a:bodyPr wrap="square" rtlCol="0">
+              <a:spAutoFit/>
+            </a:bodyPr>
+            <a:lstStyle/>
+            <a:p>
+              <a:pPr algn="r"/>
+              <a:r>
+                <a:rPr lang="en-US" dirty="0" smtClean="0">
+                  <a:solidFill>
+                    <a:schemeClr val="bg1">
+                      <a:lumMod val="65000"/>
+                    </a:schemeClr>
+                  </a:solidFill>
+                </a:rPr>
+                <a:t>Deadline</a:t>
+              </a:r>
+              <a:endParaRPr lang="en-SG" dirty="0">
+                <a:solidFill>
+                  <a:schemeClr val="bg1">
+                    <a:lumMod val="65000"/>
+                  </a:schemeClr>
+                </a:solidFill>
+              </a:endParaRPr>
+            </a:p>
+          </p:txBody>
+        </p:sp>
+        <p:sp>
+          <p:nvSpPr>
+            <p:cNvPr id="34" name="Pentagon 33"/>
+            <p:cNvSpPr/>
+            <p:nvPr/>
+          </p:nvSpPr>
+          <p:spPr>
+            <a:xfrm>
+              <a:off x="1187624" y="5661248"/>
+              <a:ext cx="4392488" cy="288032"/>
+            </a:xfrm>
+            <a:prstGeom prst="homePlate">
+              <a:avLst/>
+            </a:prstGeom>
+            <a:solidFill>
+              <a:schemeClr val="bg1">
+                <a:lumMod val="65000"/>
+              </a:schemeClr>
+            </a:solidFill>
+            <a:ln>
+              <a:solidFill>
+                <a:schemeClr val="bg1">
+                  <a:lumMod val="65000"/>
+                </a:schemeClr>
+              </a:solidFill>
+            </a:ln>
+          </p:spPr>
+          <p:style>
+            <a:lnRef idx="2">
+              <a:schemeClr val="accent1">
+                <a:shade val="50000"/>
+              </a:schemeClr>
+            </a:lnRef>
+            <a:fillRef idx="1">
+              <a:schemeClr val="accent1"/>
+            </a:fillRef>
+            <a:effectRef idx="0">
+              <a:schemeClr val="accent1"/>
+            </a:effectRef>
+            <a:fontRef idx="minor">
+              <a:schemeClr val="lt1"/>
+            </a:fontRef>
+          </p:style>
+          <p:txBody>
+            <a:bodyPr rtlCol="0" anchor="ctr"/>
+            <a:lstStyle/>
+            <a:p>
+              <a:pPr algn="ctr"/>
+              <a:r>
+                <a:rPr lang="en-US" dirty="0" smtClean="0"/>
+                <a:t>8 months</a:t>
+              </a:r>
+              <a:endParaRPr lang="en-SG" dirty="0"/>
+            </a:p>
+          </p:txBody>
+        </p:sp>
+        <p:sp>
+          <p:nvSpPr>
+            <p:cNvPr id="35" name="TextBox 34"/>
+            <p:cNvSpPr txBox="1"/>
+            <p:nvPr/>
+          </p:nvSpPr>
+          <p:spPr>
+            <a:xfrm>
+              <a:off x="827584" y="5301208"/>
+              <a:ext cx="963812" cy="369332"/>
+            </a:xfrm>
+            <a:prstGeom prst="rect">
+              <a:avLst/>
+            </a:prstGeom>
+            <a:noFill/>
+          </p:spPr>
+          <p:txBody>
+            <a:bodyPr wrap="square" rtlCol="0">
+              <a:spAutoFit/>
+            </a:bodyPr>
+            <a:lstStyle/>
+            <a:p>
+              <a:r>
+                <a:rPr lang="en-US" dirty="0" smtClean="0">
+                  <a:solidFill>
+                    <a:schemeClr val="bg1">
+                      <a:lumMod val="65000"/>
+                    </a:schemeClr>
+                  </a:solidFill>
+                </a:rPr>
+                <a:t>Kickoff</a:t>
+              </a:r>
+              <a:endParaRPr lang="en-SG" dirty="0">
+                <a:solidFill>
+                  <a:schemeClr val="bg1">
+                    <a:lumMod val="65000"/>
+                  </a:schemeClr>
+                </a:solidFill>
+              </a:endParaRPr>
+            </a:p>
+          </p:txBody>
+        </p:sp>
+        <p:sp>
+          <p:nvSpPr>
+            <p:cNvPr id="36" name="TextBox 35"/>
+            <p:cNvSpPr txBox="1"/>
+            <p:nvPr/>
+          </p:nvSpPr>
+          <p:spPr>
+            <a:xfrm>
+              <a:off x="5120356" y="5301208"/>
+              <a:ext cx="675780" cy="369332"/>
+            </a:xfrm>
+            <a:prstGeom prst="rect">
+              <a:avLst/>
+            </a:prstGeom>
+            <a:noFill/>
+          </p:spPr>
+          <p:txBody>
+            <a:bodyPr wrap="square" rtlCol="0">
+              <a:spAutoFit/>
+            </a:bodyPr>
+            <a:lstStyle/>
+            <a:p>
+              <a:r>
+                <a:rPr lang="en-US" dirty="0" smtClean="0">
+                  <a:solidFill>
+                    <a:schemeClr val="bg1">
+                      <a:lumMod val="65000"/>
+                    </a:schemeClr>
+                  </a:solidFill>
+                </a:rPr>
+                <a:t>Now</a:t>
+              </a:r>
+              <a:endParaRPr lang="en-SG" dirty="0">
+                <a:solidFill>
+                  <a:schemeClr val="bg1">
+                    <a:lumMod val="65000"/>
+                  </a:schemeClr>
+                </a:solidFill>
+              </a:endParaRPr>
+            </a:p>
+          </p:txBody>
+        </p:sp>
+      </p:grpSp>
     </p:spTree>
     <p:extLst>
       <p:ext uri="{BB962C8B-B14F-4D97-AF65-F5344CB8AC3E}">

</xml_diff>